<commit_message>
Slides and cache from query updated
Slides and cache from query updated
</commit_message>
<xml_diff>
--- a/ASP.NET Presentation_2.pptx
+++ b/ASP.NET Presentation_2.pptx
@@ -5,7 +5,7 @@
     <p:sldMasterId id="2147483677" r:id="rId1"/>
   </p:sldMasterIdLst>
   <p:notesMasterIdLst>
-    <p:notesMasterId r:id="rId14"/>
+    <p:notesMasterId r:id="rId15"/>
   </p:notesMasterIdLst>
   <p:sldIdLst>
     <p:sldId id="401" r:id="rId2"/>
@@ -19,7 +19,8 @@
     <p:sldId id="412" r:id="rId10"/>
     <p:sldId id="267" r:id="rId11"/>
     <p:sldId id="417" r:id="rId12"/>
-    <p:sldId id="413" r:id="rId13"/>
+    <p:sldId id="418" r:id="rId13"/>
+    <p:sldId id="413" r:id="rId14"/>
   </p:sldIdLst>
   <p:sldSz cx="12192000" cy="6858000"/>
   <p:notesSz cx="6858000" cy="9144000"/>
@@ -219,7 +220,7 @@
           <a:p>
             <a:fld id="{08B5203A-E65A-410B-BB27-74539FE81CB7}" type="datetimeFigureOut">
               <a:rPr lang="en-US" smtClean="0"/>
-              <a:t>12-Sep-15</a:t>
+              <a:t>16-Sep-15</a:t>
             </a:fld>
             <a:endParaRPr lang="en-US"/>
           </a:p>
@@ -531,6 +532,258 @@
           <a:bodyPr/>
           <a:lstStyle/>
           <a:p>
+            <a:endParaRPr lang="en-US" dirty="0"/>
+          </a:p>
+        </p:txBody>
+      </p:sp>
+      <p:sp>
+        <p:nvSpPr>
+          <p:cNvPr id="4" name="Slide Number Placeholder 3"/>
+          <p:cNvSpPr>
+            <a:spLocks noGrp="1"/>
+          </p:cNvSpPr>
+          <p:nvPr>
+            <p:ph type="sldNum" sz="quarter" idx="10"/>
+          </p:nvPr>
+        </p:nvSpPr>
+        <p:spPr/>
+        <p:txBody>
+          <a:bodyPr/>
+          <a:lstStyle/>
+          <a:p>
+            <a:fld id="{924ABC8A-E015-49F9-B6B7-D277BB3EECF6}" type="slidenum">
+              <a:rPr lang="en-US" smtClean="0"/>
+              <a:t>1</a:t>
+            </a:fld>
+            <a:endParaRPr lang="en-US"/>
+          </a:p>
+        </p:txBody>
+      </p:sp>
+    </p:spTree>
+    <p:extLst>
+      <p:ext uri="{BB962C8B-B14F-4D97-AF65-F5344CB8AC3E}">
+        <p14:creationId xmlns:p14="http://schemas.microsoft.com/office/powerpoint/2010/main" val="877753582"/>
+      </p:ext>
+    </p:extLst>
+  </p:cSld>
+  <p:clrMapOvr>
+    <a:masterClrMapping/>
+  </p:clrMapOvr>
+</p:notes>
+</file>
+
+<file path=ppt/notesSlides/notesSlide2.xml><?xml version="1.0" encoding="utf-8"?>
+<p:notes xmlns:a="http://schemas.openxmlformats.org/drawingml/2006/main" xmlns:r="http://schemas.openxmlformats.org/officeDocument/2006/relationships" xmlns:p="http://schemas.openxmlformats.org/presentationml/2006/main">
+  <p:cSld>
+    <p:spTree>
+      <p:nvGrpSpPr>
+        <p:cNvPr id="1" name=""/>
+        <p:cNvGrpSpPr/>
+        <p:nvPr/>
+      </p:nvGrpSpPr>
+      <p:grpSpPr>
+        <a:xfrm>
+          <a:off x="0" y="0"/>
+          <a:ext cx="0" cy="0"/>
+          <a:chOff x="0" y="0"/>
+          <a:chExt cx="0" cy="0"/>
+        </a:xfrm>
+      </p:grpSpPr>
+      <p:sp>
+        <p:nvSpPr>
+          <p:cNvPr id="2" name="Slide Image Placeholder 1"/>
+          <p:cNvSpPr>
+            <a:spLocks noGrp="1" noRot="1" noChangeAspect="1"/>
+          </p:cNvSpPr>
+          <p:nvPr>
+            <p:ph type="sldImg"/>
+          </p:nvPr>
+        </p:nvSpPr>
+        <p:spPr/>
+      </p:sp>
+      <p:sp>
+        <p:nvSpPr>
+          <p:cNvPr id="3" name="Notes Placeholder 2"/>
+          <p:cNvSpPr>
+            <a:spLocks noGrp="1"/>
+          </p:cNvSpPr>
+          <p:nvPr>
+            <p:ph type="body" idx="1"/>
+          </p:nvPr>
+        </p:nvSpPr>
+        <p:spPr/>
+        <p:txBody>
+          <a:bodyPr/>
+          <a:lstStyle/>
+          <a:p>
+            <a:endParaRPr lang="en-US"/>
+          </a:p>
+        </p:txBody>
+      </p:sp>
+      <p:sp>
+        <p:nvSpPr>
+          <p:cNvPr id="4" name="Slide Number Placeholder 3"/>
+          <p:cNvSpPr>
+            <a:spLocks noGrp="1"/>
+          </p:cNvSpPr>
+          <p:nvPr>
+            <p:ph type="sldNum" sz="quarter" idx="10"/>
+          </p:nvPr>
+        </p:nvSpPr>
+        <p:spPr/>
+        <p:txBody>
+          <a:bodyPr/>
+          <a:lstStyle/>
+          <a:p>
+            <a:fld id="{924ABC8A-E015-49F9-B6B7-D277BB3EECF6}" type="slidenum">
+              <a:rPr lang="en-US" smtClean="0"/>
+              <a:t>2</a:t>
+            </a:fld>
+            <a:endParaRPr lang="en-US"/>
+          </a:p>
+        </p:txBody>
+      </p:sp>
+    </p:spTree>
+    <p:extLst>
+      <p:ext uri="{BB962C8B-B14F-4D97-AF65-F5344CB8AC3E}">
+        <p14:creationId xmlns:p14="http://schemas.microsoft.com/office/powerpoint/2010/main" val="1929761054"/>
+      </p:ext>
+    </p:extLst>
+  </p:cSld>
+  <p:clrMapOvr>
+    <a:masterClrMapping/>
+  </p:clrMapOvr>
+</p:notes>
+</file>
+
+<file path=ppt/notesSlides/notesSlide3.xml><?xml version="1.0" encoding="utf-8"?>
+<p:notes xmlns:a="http://schemas.openxmlformats.org/drawingml/2006/main" xmlns:r="http://schemas.openxmlformats.org/officeDocument/2006/relationships" xmlns:p="http://schemas.openxmlformats.org/presentationml/2006/main">
+  <p:cSld>
+    <p:spTree>
+      <p:nvGrpSpPr>
+        <p:cNvPr id="1" name=""/>
+        <p:cNvGrpSpPr/>
+        <p:nvPr/>
+      </p:nvGrpSpPr>
+      <p:grpSpPr>
+        <a:xfrm>
+          <a:off x="0" y="0"/>
+          <a:ext cx="0" cy="0"/>
+          <a:chOff x="0" y="0"/>
+          <a:chExt cx="0" cy="0"/>
+        </a:xfrm>
+      </p:grpSpPr>
+      <p:sp>
+        <p:nvSpPr>
+          <p:cNvPr id="2" name="Slide Image Placeholder 1"/>
+          <p:cNvSpPr>
+            <a:spLocks noGrp="1" noRot="1" noChangeAspect="1"/>
+          </p:cNvSpPr>
+          <p:nvPr>
+            <p:ph type="sldImg"/>
+          </p:nvPr>
+        </p:nvSpPr>
+        <p:spPr/>
+      </p:sp>
+      <p:sp>
+        <p:nvSpPr>
+          <p:cNvPr id="3" name="Notes Placeholder 2"/>
+          <p:cNvSpPr>
+            <a:spLocks noGrp="1"/>
+          </p:cNvSpPr>
+          <p:nvPr>
+            <p:ph type="body" idx="1"/>
+          </p:nvPr>
+        </p:nvSpPr>
+        <p:spPr/>
+        <p:txBody>
+          <a:bodyPr/>
+          <a:lstStyle/>
+          <a:p>
+            <a:endParaRPr lang="en-US"/>
+          </a:p>
+        </p:txBody>
+      </p:sp>
+      <p:sp>
+        <p:nvSpPr>
+          <p:cNvPr id="4" name="Slide Number Placeholder 3"/>
+          <p:cNvSpPr>
+            <a:spLocks noGrp="1"/>
+          </p:cNvSpPr>
+          <p:nvPr>
+            <p:ph type="sldNum" sz="quarter" idx="10"/>
+          </p:nvPr>
+        </p:nvSpPr>
+        <p:spPr/>
+        <p:txBody>
+          <a:bodyPr/>
+          <a:lstStyle/>
+          <a:p>
+            <a:fld id="{924ABC8A-E015-49F9-B6B7-D277BB3EECF6}" type="slidenum">
+              <a:rPr lang="en-US" smtClean="0"/>
+              <a:t>3</a:t>
+            </a:fld>
+            <a:endParaRPr lang="en-US"/>
+          </a:p>
+        </p:txBody>
+      </p:sp>
+    </p:spTree>
+    <p:extLst>
+      <p:ext uri="{BB962C8B-B14F-4D97-AF65-F5344CB8AC3E}">
+        <p14:creationId xmlns:p14="http://schemas.microsoft.com/office/powerpoint/2010/main" val="103111010"/>
+      </p:ext>
+    </p:extLst>
+  </p:cSld>
+  <p:clrMapOvr>
+    <a:masterClrMapping/>
+  </p:clrMapOvr>
+</p:notes>
+</file>
+
+<file path=ppt/notesSlides/notesSlide4.xml><?xml version="1.0" encoding="utf-8"?>
+<p:notes xmlns:a="http://schemas.openxmlformats.org/drawingml/2006/main" xmlns:r="http://schemas.openxmlformats.org/officeDocument/2006/relationships" xmlns:p="http://schemas.openxmlformats.org/presentationml/2006/main">
+  <p:cSld>
+    <p:spTree>
+      <p:nvGrpSpPr>
+        <p:cNvPr id="1" name=""/>
+        <p:cNvGrpSpPr/>
+        <p:nvPr/>
+      </p:nvGrpSpPr>
+      <p:grpSpPr>
+        <a:xfrm>
+          <a:off x="0" y="0"/>
+          <a:ext cx="0" cy="0"/>
+          <a:chOff x="0" y="0"/>
+          <a:chExt cx="0" cy="0"/>
+        </a:xfrm>
+      </p:grpSpPr>
+      <p:sp>
+        <p:nvSpPr>
+          <p:cNvPr id="2" name="Slide Image Placeholder 1"/>
+          <p:cNvSpPr>
+            <a:spLocks noGrp="1" noRot="1" noChangeAspect="1"/>
+          </p:cNvSpPr>
+          <p:nvPr>
+            <p:ph type="sldImg"/>
+          </p:nvPr>
+        </p:nvSpPr>
+        <p:spPr/>
+      </p:sp>
+      <p:sp>
+        <p:nvSpPr>
+          <p:cNvPr id="3" name="Notes Placeholder 2"/>
+          <p:cNvSpPr>
+            <a:spLocks noGrp="1"/>
+          </p:cNvSpPr>
+          <p:nvPr>
+            <p:ph type="body" idx="1"/>
+          </p:nvPr>
+        </p:nvSpPr>
+        <p:spPr/>
+        <p:txBody>
+          <a:bodyPr/>
+          <a:lstStyle/>
+          <a:p>
             <a:r>
               <a:rPr lang="en-US" smtClean="0"/>
               <a:t>You are not giving</a:t>
@@ -719,7 +972,7 @@
           <a:p>
             <a:fld id="{9863F11F-9756-4F3A-AEAA-DD62EB99D8E4}" type="datetimeFigureOut">
               <a:rPr lang="en-US" smtClean="0"/>
-              <a:t>12-Sep-15</a:t>
+              <a:t>16-Sep-15</a:t>
             </a:fld>
             <a:endParaRPr lang="en-US"/>
           </a:p>
@@ -889,7 +1142,7 @@
           <a:p>
             <a:fld id="{9863F11F-9756-4F3A-AEAA-DD62EB99D8E4}" type="datetimeFigureOut">
               <a:rPr lang="en-US" smtClean="0"/>
-              <a:t>12-Sep-15</a:t>
+              <a:t>16-Sep-15</a:t>
             </a:fld>
             <a:endParaRPr lang="en-US"/>
           </a:p>
@@ -1069,7 +1322,7 @@
           <a:p>
             <a:fld id="{9863F11F-9756-4F3A-AEAA-DD62EB99D8E4}" type="datetimeFigureOut">
               <a:rPr lang="en-US" smtClean="0"/>
-              <a:t>12-Sep-15</a:t>
+              <a:t>16-Sep-15</a:t>
             </a:fld>
             <a:endParaRPr lang="en-US"/>
           </a:p>
@@ -1239,7 +1492,7 @@
           <a:p>
             <a:fld id="{9863F11F-9756-4F3A-AEAA-DD62EB99D8E4}" type="datetimeFigureOut">
               <a:rPr lang="en-US" smtClean="0"/>
-              <a:t>12-Sep-15</a:t>
+              <a:t>16-Sep-15</a:t>
             </a:fld>
             <a:endParaRPr lang="en-US"/>
           </a:p>
@@ -1485,7 +1738,7 @@
           <a:p>
             <a:fld id="{9863F11F-9756-4F3A-AEAA-DD62EB99D8E4}" type="datetimeFigureOut">
               <a:rPr lang="en-US" smtClean="0"/>
-              <a:t>12-Sep-15</a:t>
+              <a:t>16-Sep-15</a:t>
             </a:fld>
             <a:endParaRPr lang="en-US"/>
           </a:p>
@@ -1717,7 +1970,7 @@
           <a:p>
             <a:fld id="{9863F11F-9756-4F3A-AEAA-DD62EB99D8E4}" type="datetimeFigureOut">
               <a:rPr lang="en-US" smtClean="0"/>
-              <a:t>12-Sep-15</a:t>
+              <a:t>16-Sep-15</a:t>
             </a:fld>
             <a:endParaRPr lang="en-US"/>
           </a:p>
@@ -2084,7 +2337,7 @@
           <a:p>
             <a:fld id="{9863F11F-9756-4F3A-AEAA-DD62EB99D8E4}" type="datetimeFigureOut">
               <a:rPr lang="en-US" smtClean="0"/>
-              <a:t>12-Sep-15</a:t>
+              <a:t>16-Sep-15</a:t>
             </a:fld>
             <a:endParaRPr lang="en-US"/>
           </a:p>
@@ -2202,7 +2455,7 @@
           <a:p>
             <a:fld id="{9863F11F-9756-4F3A-AEAA-DD62EB99D8E4}" type="datetimeFigureOut">
               <a:rPr lang="en-US" smtClean="0"/>
-              <a:t>12-Sep-15</a:t>
+              <a:t>16-Sep-15</a:t>
             </a:fld>
             <a:endParaRPr lang="en-US"/>
           </a:p>
@@ -2297,7 +2550,7 @@
           <a:p>
             <a:fld id="{9863F11F-9756-4F3A-AEAA-DD62EB99D8E4}" type="datetimeFigureOut">
               <a:rPr lang="en-US" smtClean="0"/>
-              <a:t>12-Sep-15</a:t>
+              <a:t>16-Sep-15</a:t>
             </a:fld>
             <a:endParaRPr lang="en-US"/>
           </a:p>
@@ -2574,7 +2827,7 @@
           <a:p>
             <a:fld id="{9863F11F-9756-4F3A-AEAA-DD62EB99D8E4}" type="datetimeFigureOut">
               <a:rPr lang="en-US" smtClean="0"/>
-              <a:t>12-Sep-15</a:t>
+              <a:t>16-Sep-15</a:t>
             </a:fld>
             <a:endParaRPr lang="en-US"/>
           </a:p>
@@ -2827,7 +3080,7 @@
           <a:p>
             <a:fld id="{9863F11F-9756-4F3A-AEAA-DD62EB99D8E4}" type="datetimeFigureOut">
               <a:rPr lang="en-US" smtClean="0"/>
-              <a:t>12-Sep-15</a:t>
+              <a:t>16-Sep-15</a:t>
             </a:fld>
             <a:endParaRPr lang="en-US"/>
           </a:p>
@@ -3040,7 +3293,7 @@
           <a:p>
             <a:fld id="{9863F11F-9756-4F3A-AEAA-DD62EB99D8E4}" type="datetimeFigureOut">
               <a:rPr lang="en-US" smtClean="0"/>
-              <a:t>12-Sep-15</a:t>
+              <a:t>16-Sep-15</a:t>
             </a:fld>
             <a:endParaRPr lang="en-US"/>
           </a:p>
@@ -3489,14 +3742,19 @@
             <p:ph type="body" idx="1"/>
           </p:nvPr>
         </p:nvSpPr>
-        <p:spPr/>
+        <p:spPr>
+          <a:xfrm>
+            <a:off x="831850" y="4589464"/>
+            <a:ext cx="10515600" cy="506948"/>
+          </a:xfrm>
+        </p:spPr>
         <p:txBody>
           <a:bodyPr/>
           <a:lstStyle/>
           <a:p>
             <a:r>
               <a:rPr lang="en-US" dirty="0" smtClean="0"/>
-              <a:t>A enterprise development framework which can developer’s life.</a:t>
+              <a:t>An enterprise development framework which can developer’s life.</a:t>
             </a:r>
             <a:endParaRPr lang="en-US" dirty="0"/>
           </a:p>
@@ -5151,57 +5409,73 @@
               <a:buAutoNum type="arabicPeriod"/>
             </a:pPr>
             <a:r>
+              <a:rPr lang="en-US" dirty="0" smtClean="0">
+                <a:hlinkClick r:id="rId2"/>
+              </a:rPr>
+              <a:t>http</a:t>
+            </a:r>
+            <a:r>
               <a:rPr lang="en-US" dirty="0">
                 <a:hlinkClick r:id="rId2"/>
               </a:rPr>
-              <a:t>http://</a:t>
+              <a:t>://</a:t>
             </a:r>
             <a:r>
               <a:rPr lang="en-US" dirty="0" smtClean="0">
                 <a:hlinkClick r:id="rId2"/>
               </a:rPr>
-              <a:t>www.pluralsight.com/courses/web-security-owasp-top10-big-picture</a:t>
-            </a:r>
-            <a:r>
-              <a:rPr lang="en-US" dirty="0" smtClean="0"/>
+              <a:t>yslow.org</a:t>
+            </a:r>
+            <a:r>
+              <a:rPr lang="en-US" dirty="0"/>
               <a:t> </a:t>
             </a:r>
+            <a:endParaRPr lang="en-US" dirty="0" smtClean="0"/>
           </a:p>
           <a:p>
             <a:pPr marL="342900" indent="-342900">
               <a:buAutoNum type="arabicPeriod"/>
             </a:pPr>
             <a:r>
+              <a:rPr lang="en-US" dirty="0" smtClean="0"/>
+              <a:t>ASP.NET MVC </a:t>
+            </a:r>
+            <a:r>
+              <a:rPr lang="en-US" dirty="0"/>
+              <a:t>Basics : </a:t>
+            </a:r>
+            <a:r>
+              <a:rPr lang="en-US" dirty="0">
+                <a:hlinkClick r:id="rId3"/>
+              </a:rPr>
+              <a:t>http://</a:t>
+            </a:r>
+            <a:r>
               <a:rPr lang="en-US" dirty="0" smtClean="0">
                 <a:hlinkClick r:id="rId3"/>
               </a:rPr>
-              <a:t>http</a:t>
-            </a:r>
-            <a:r>
-              <a:rPr lang="en-US" dirty="0">
-                <a:hlinkClick r:id="rId3"/>
-              </a:rPr>
-              <a:t>://</a:t>
-            </a:r>
-            <a:r>
-              <a:rPr lang="en-US" dirty="0" smtClean="0">
-                <a:hlinkClick r:id="rId3"/>
-              </a:rPr>
-              <a:t>yslow.org</a:t>
-            </a:r>
-            <a:r>
-              <a:rPr lang="en-US" dirty="0"/>
-              <a:t> </a:t>
-            </a:r>
-            <a:endParaRPr lang="en-US" dirty="0" smtClean="0"/>
+              <a:t>bit.ly/1OtU7ow</a:t>
+            </a:r>
+            <a:r>
+              <a:rPr lang="en-US" dirty="0" smtClean="0"/>
+              <a:t>  </a:t>
+            </a:r>
           </a:p>
           <a:p>
             <a:pPr marL="342900" indent="-342900">
               <a:buAutoNum type="arabicPeriod"/>
             </a:pPr>
             <a:r>
+              <a:rPr lang="en-US" dirty="0" err="1" smtClean="0"/>
+              <a:t>Yslow</a:t>
+            </a:r>
+            <a:r>
+              <a:rPr lang="en-US" dirty="0" smtClean="0"/>
+              <a:t> Implementation : Bigger</a:t>
+            </a:r>
+            <a:r>
               <a:rPr lang="en-US" dirty="0"/>
-              <a:t>Bigger, Faster, Stronger: Optimizing ASP.NET Applications (</a:t>
+              <a:t>, Faster, Stronger: Optimizing ASP.NET Applications (</a:t>
             </a:r>
             <a:r>
               <a:rPr lang="en-US" dirty="0">
@@ -5239,7 +5513,7 @@
               <a:rPr lang="en-US" dirty="0" smtClean="0">
                 <a:hlinkClick r:id="rId5"/>
               </a:rPr>
-              <a:t>amzn.to/1UO1Ai71</a:t>
+              <a:t>amzn.to/1OtU9wI</a:t>
             </a:r>
             <a:r>
               <a:rPr lang="en-US" dirty="0" smtClean="0"/>
@@ -5269,7 +5543,11 @@
             </a:pPr>
             <a:r>
               <a:rPr lang="en-US" dirty="0"/>
-              <a:t>JavaScript Framework : </a:t>
+              <a:t>JavaScript Framework </a:t>
+            </a:r>
+            <a:r>
+              <a:rPr lang="en-US" dirty="0" smtClean="0"/>
+              <a:t>Code: </a:t>
             </a:r>
             <a:r>
               <a:rPr lang="en-US" dirty="0">
@@ -5297,6 +5575,201 @@
           <a:p>
             <a:pPr marL="342900" indent="-342900">
               <a:buAutoNum type="arabicPeriod"/>
+            </a:pPr>
+            <a:endParaRPr lang="en-US" dirty="0"/>
+          </a:p>
+        </p:txBody>
+      </p:sp>
+      <p:sp>
+        <p:nvSpPr>
+          <p:cNvPr id="7" name="TextBox 6"/>
+          <p:cNvSpPr txBox="1"/>
+          <p:nvPr/>
+        </p:nvSpPr>
+        <p:spPr>
+          <a:xfrm>
+            <a:off x="5476022" y="788316"/>
+            <a:ext cx="6296878" cy="2308324"/>
+          </a:xfrm>
+          <a:prstGeom prst="rect">
+            <a:avLst/>
+          </a:prstGeom>
+          <a:noFill/>
+        </p:spPr>
+        <p:txBody>
+          <a:bodyPr wrap="square" rtlCol="0">
+            <a:spAutoFit/>
+          </a:bodyPr>
+          <a:lstStyle/>
+          <a:p>
+            <a:pPr marL="342900" indent="-342900">
+              <a:buFont typeface="+mj-lt"/>
+              <a:buAutoNum type="arabicPeriod" startAt="6"/>
+            </a:pPr>
+            <a:r>
+              <a:rPr lang="en-US" dirty="0" smtClean="0"/>
+              <a:t>JavaScript Framework how it is implemented : </a:t>
+            </a:r>
+            <a:r>
+              <a:rPr lang="en-US" dirty="0"/>
+              <a:t> </a:t>
+            </a:r>
+            <a:r>
+              <a:rPr lang="en-US" dirty="0">
+                <a:hlinkClick r:id="rId8"/>
+              </a:rPr>
+              <a:t>http://</a:t>
+            </a:r>
+            <a:r>
+              <a:rPr lang="en-US" dirty="0" smtClean="0">
+                <a:hlinkClick r:id="rId8"/>
+              </a:rPr>
+              <a:t>bit.ly/1KdWSHD</a:t>
+            </a:r>
+            <a:r>
+              <a:rPr lang="en-US" dirty="0"/>
+              <a:t> | </a:t>
+            </a:r>
+            <a:r>
+              <a:rPr lang="en-US" dirty="0">
+                <a:hlinkClick r:id="rId9"/>
+              </a:rPr>
+              <a:t>http://</a:t>
+            </a:r>
+            <a:r>
+              <a:rPr lang="en-US" dirty="0" smtClean="0">
+                <a:hlinkClick r:id="rId9"/>
+              </a:rPr>
+              <a:t>bit.ly/1KdX0qq</a:t>
+            </a:r>
+            <a:r>
+              <a:rPr lang="en-US" dirty="0" smtClean="0"/>
+              <a:t> </a:t>
+            </a:r>
+          </a:p>
+          <a:p>
+            <a:pPr marL="342900" indent="-342900">
+              <a:buFont typeface="+mj-lt"/>
+              <a:buAutoNum type="arabicPeriod" startAt="6"/>
+            </a:pPr>
+            <a:r>
+              <a:rPr lang="en-US" dirty="0" err="1" smtClean="0"/>
+              <a:t>Lesshat</a:t>
+            </a:r>
+            <a:r>
+              <a:rPr lang="en-US" dirty="0"/>
+              <a:t> : </a:t>
+            </a:r>
+            <a:r>
+              <a:rPr lang="en-US" dirty="0">
+                <a:hlinkClick r:id="rId10"/>
+              </a:rPr>
+              <a:t>http://</a:t>
+            </a:r>
+            <a:r>
+              <a:rPr lang="en-US" dirty="0" smtClean="0">
+                <a:hlinkClick r:id="rId10"/>
+              </a:rPr>
+              <a:t>bit.ly/1KdX75o</a:t>
+            </a:r>
+            <a:endParaRPr lang="en-US" dirty="0" smtClean="0"/>
+          </a:p>
+          <a:p>
+            <a:pPr marL="342900" indent="-342900">
+              <a:buFont typeface="+mj-lt"/>
+              <a:buAutoNum type="arabicPeriod" startAt="6"/>
+            </a:pPr>
+            <a:r>
+              <a:rPr lang="en-US" dirty="0"/>
+              <a:t>Twitter Bootstrap : </a:t>
+            </a:r>
+            <a:r>
+              <a:rPr lang="en-US" dirty="0">
+                <a:hlinkClick r:id="rId11"/>
+              </a:rPr>
+              <a:t>http://</a:t>
+            </a:r>
+            <a:r>
+              <a:rPr lang="en-US" dirty="0" smtClean="0">
+                <a:hlinkClick r:id="rId11"/>
+              </a:rPr>
+              <a:t>getbootstrap.com</a:t>
+            </a:r>
+            <a:r>
+              <a:rPr lang="en-US" dirty="0" smtClean="0"/>
+              <a:t> </a:t>
+            </a:r>
+          </a:p>
+          <a:p>
+            <a:pPr marL="342900" indent="-342900">
+              <a:buFont typeface="+mj-lt"/>
+              <a:buAutoNum type="arabicPeriod" startAt="6"/>
+            </a:pPr>
+            <a:r>
+              <a:rPr lang="en-US" b="1" dirty="0" err="1" smtClean="0"/>
+              <a:t>DevMvcComponent</a:t>
+            </a:r>
+            <a:r>
+              <a:rPr lang="en-US" b="1" dirty="0" smtClean="0"/>
+              <a:t> </a:t>
+            </a:r>
+            <a:r>
+              <a:rPr lang="en-US" b="1" dirty="0"/>
+              <a:t>: </a:t>
+            </a:r>
+            <a:r>
+              <a:rPr lang="en-US" b="1" dirty="0">
+                <a:hlinkClick r:id="rId12"/>
+              </a:rPr>
+              <a:t>http://</a:t>
+            </a:r>
+            <a:r>
+              <a:rPr lang="en-US" b="1" dirty="0" smtClean="0">
+                <a:hlinkClick r:id="rId12"/>
+              </a:rPr>
+              <a:t>bit.ly/1KdXhd5</a:t>
+            </a:r>
+            <a:endParaRPr lang="en-US" b="1" dirty="0" smtClean="0"/>
+          </a:p>
+          <a:p>
+            <a:pPr marL="342900" indent="-342900">
+              <a:buFont typeface="+mj-lt"/>
+              <a:buAutoNum type="arabicPeriod" startAt="6"/>
+            </a:pPr>
+            <a:r>
+              <a:rPr lang="en-US" b="1" dirty="0" smtClean="0"/>
+              <a:t>Presentation Codes </a:t>
+            </a:r>
+            <a:r>
+              <a:rPr lang="en-US" b="1" dirty="0"/>
+              <a:t>: </a:t>
+            </a:r>
+            <a:r>
+              <a:rPr lang="en-US" b="1" dirty="0">
+                <a:hlinkClick r:id="rId13"/>
+              </a:rPr>
+              <a:t>http://</a:t>
+            </a:r>
+            <a:r>
+              <a:rPr lang="en-US" b="1" dirty="0" smtClean="0">
+                <a:hlinkClick r:id="rId13"/>
+              </a:rPr>
+              <a:t>bit.ly/1OtTL1f</a:t>
+            </a:r>
+            <a:r>
+              <a:rPr lang="en-US" b="1" dirty="0" smtClean="0"/>
+              <a:t>   </a:t>
+            </a:r>
+          </a:p>
+          <a:p>
+            <a:pPr marL="342900" indent="-342900">
+              <a:buAutoNum type="arabicPeriod" startAt="6"/>
+            </a:pPr>
+            <a:endParaRPr lang="en-US" dirty="0" smtClean="0"/>
+          </a:p>
+          <a:p>
+            <a:pPr marL="342900" indent="-342900">
+              <a:buAutoNum type="arabicPeriod" startAt="6"/>
             </a:pPr>
             <a:endParaRPr lang="en-US" dirty="0"/>
           </a:p>
@@ -5850,6 +6323,311 @@
                       </p:childTnLst>
                     </p:cTn>
                   </p:par>
+                  <p:par>
+                    <p:cTn id="46" fill="hold">
+                      <p:stCondLst>
+                        <p:cond delay="indefinite"/>
+                      </p:stCondLst>
+                      <p:childTnLst>
+                        <p:par>
+                          <p:cTn id="47" fill="hold">
+                            <p:stCondLst>
+                              <p:cond delay="0"/>
+                            </p:stCondLst>
+                            <p:childTnLst>
+                              <p:par>
+                                <p:cTn id="48" presetID="10" presetClass="entr" presetSubtype="0" fill="hold" grpId="0" nodeType="clickEffect">
+                                  <p:stCondLst>
+                                    <p:cond delay="0"/>
+                                  </p:stCondLst>
+                                  <p:childTnLst>
+                                    <p:set>
+                                      <p:cBhvr>
+                                        <p:cTn id="49" dur="1" fill="hold">
+                                          <p:stCondLst>
+                                            <p:cond delay="0"/>
+                                          </p:stCondLst>
+                                        </p:cTn>
+                                        <p:tgtEl>
+                                          <p:spTgt spid="7">
+                                            <p:txEl>
+                                              <p:pRg st="0" end="0"/>
+                                            </p:txEl>
+                                          </p:spTgt>
+                                        </p:tgtEl>
+                                        <p:attrNameLst>
+                                          <p:attrName>style.visibility</p:attrName>
+                                        </p:attrNameLst>
+                                      </p:cBhvr>
+                                      <p:to>
+                                        <p:strVal val="visible"/>
+                                      </p:to>
+                                    </p:set>
+                                    <p:animEffect transition="in" filter="fade">
+                                      <p:cBhvr>
+                                        <p:cTn id="50" dur="500"/>
+                                        <p:tgtEl>
+                                          <p:spTgt spid="7">
+                                            <p:txEl>
+                                              <p:pRg st="0" end="0"/>
+                                            </p:txEl>
+                                          </p:spTgt>
+                                        </p:tgtEl>
+                                      </p:cBhvr>
+                                    </p:animEffect>
+                                  </p:childTnLst>
+                                </p:cTn>
+                              </p:par>
+                            </p:childTnLst>
+                          </p:cTn>
+                        </p:par>
+                      </p:childTnLst>
+                    </p:cTn>
+                  </p:par>
+                  <p:par>
+                    <p:cTn id="51" fill="hold">
+                      <p:stCondLst>
+                        <p:cond delay="indefinite"/>
+                      </p:stCondLst>
+                      <p:childTnLst>
+                        <p:par>
+                          <p:cTn id="52" fill="hold">
+                            <p:stCondLst>
+                              <p:cond delay="0"/>
+                            </p:stCondLst>
+                            <p:childTnLst>
+                              <p:par>
+                                <p:cTn id="53" presetID="10" presetClass="entr" presetSubtype="0" fill="hold" grpId="0" nodeType="clickEffect">
+                                  <p:stCondLst>
+                                    <p:cond delay="0"/>
+                                  </p:stCondLst>
+                                  <p:childTnLst>
+                                    <p:set>
+                                      <p:cBhvr>
+                                        <p:cTn id="54" dur="1" fill="hold">
+                                          <p:stCondLst>
+                                            <p:cond delay="0"/>
+                                          </p:stCondLst>
+                                        </p:cTn>
+                                        <p:tgtEl>
+                                          <p:spTgt spid="7">
+                                            <p:txEl>
+                                              <p:pRg st="1" end="1"/>
+                                            </p:txEl>
+                                          </p:spTgt>
+                                        </p:tgtEl>
+                                        <p:attrNameLst>
+                                          <p:attrName>style.visibility</p:attrName>
+                                        </p:attrNameLst>
+                                      </p:cBhvr>
+                                      <p:to>
+                                        <p:strVal val="visible"/>
+                                      </p:to>
+                                    </p:set>
+                                    <p:animEffect transition="in" filter="fade">
+                                      <p:cBhvr>
+                                        <p:cTn id="55" dur="500"/>
+                                        <p:tgtEl>
+                                          <p:spTgt spid="7">
+                                            <p:txEl>
+                                              <p:pRg st="1" end="1"/>
+                                            </p:txEl>
+                                          </p:spTgt>
+                                        </p:tgtEl>
+                                      </p:cBhvr>
+                                    </p:animEffect>
+                                  </p:childTnLst>
+                                </p:cTn>
+                              </p:par>
+                            </p:childTnLst>
+                          </p:cTn>
+                        </p:par>
+                      </p:childTnLst>
+                    </p:cTn>
+                  </p:par>
+                  <p:par>
+                    <p:cTn id="56" fill="hold">
+                      <p:stCondLst>
+                        <p:cond delay="indefinite"/>
+                      </p:stCondLst>
+                      <p:childTnLst>
+                        <p:par>
+                          <p:cTn id="57" fill="hold">
+                            <p:stCondLst>
+                              <p:cond delay="0"/>
+                            </p:stCondLst>
+                            <p:childTnLst>
+                              <p:par>
+                                <p:cTn id="58" presetID="10" presetClass="entr" presetSubtype="0" fill="hold" grpId="0" nodeType="clickEffect">
+                                  <p:stCondLst>
+                                    <p:cond delay="0"/>
+                                  </p:stCondLst>
+                                  <p:childTnLst>
+                                    <p:set>
+                                      <p:cBhvr>
+                                        <p:cTn id="59" dur="1" fill="hold">
+                                          <p:stCondLst>
+                                            <p:cond delay="0"/>
+                                          </p:stCondLst>
+                                        </p:cTn>
+                                        <p:tgtEl>
+                                          <p:spTgt spid="7">
+                                            <p:txEl>
+                                              <p:pRg st="2" end="2"/>
+                                            </p:txEl>
+                                          </p:spTgt>
+                                        </p:tgtEl>
+                                        <p:attrNameLst>
+                                          <p:attrName>style.visibility</p:attrName>
+                                        </p:attrNameLst>
+                                      </p:cBhvr>
+                                      <p:to>
+                                        <p:strVal val="visible"/>
+                                      </p:to>
+                                    </p:set>
+                                    <p:animEffect transition="in" filter="fade">
+                                      <p:cBhvr>
+                                        <p:cTn id="60" dur="500"/>
+                                        <p:tgtEl>
+                                          <p:spTgt spid="7">
+                                            <p:txEl>
+                                              <p:pRg st="2" end="2"/>
+                                            </p:txEl>
+                                          </p:spTgt>
+                                        </p:tgtEl>
+                                      </p:cBhvr>
+                                    </p:animEffect>
+                                  </p:childTnLst>
+                                </p:cTn>
+                              </p:par>
+                            </p:childTnLst>
+                          </p:cTn>
+                        </p:par>
+                      </p:childTnLst>
+                    </p:cTn>
+                  </p:par>
+                  <p:par>
+                    <p:cTn id="61" fill="hold">
+                      <p:stCondLst>
+                        <p:cond delay="indefinite"/>
+                      </p:stCondLst>
+                      <p:childTnLst>
+                        <p:par>
+                          <p:cTn id="62" fill="hold">
+                            <p:stCondLst>
+                              <p:cond delay="0"/>
+                            </p:stCondLst>
+                            <p:childTnLst>
+                              <p:par>
+                                <p:cTn id="63" presetID="10" presetClass="entr" presetSubtype="0" fill="hold" grpId="0" nodeType="clickEffect">
+                                  <p:stCondLst>
+                                    <p:cond delay="0"/>
+                                  </p:stCondLst>
+                                  <p:childTnLst>
+                                    <p:set>
+                                      <p:cBhvr>
+                                        <p:cTn id="64" dur="1" fill="hold">
+                                          <p:stCondLst>
+                                            <p:cond delay="0"/>
+                                          </p:stCondLst>
+                                        </p:cTn>
+                                        <p:tgtEl>
+                                          <p:spTgt spid="7">
+                                            <p:txEl>
+                                              <p:pRg st="3" end="3"/>
+                                            </p:txEl>
+                                          </p:spTgt>
+                                        </p:tgtEl>
+                                        <p:attrNameLst>
+                                          <p:attrName>style.visibility</p:attrName>
+                                        </p:attrNameLst>
+                                      </p:cBhvr>
+                                      <p:to>
+                                        <p:strVal val="visible"/>
+                                      </p:to>
+                                    </p:set>
+                                    <p:animEffect transition="in" filter="fade">
+                                      <p:cBhvr>
+                                        <p:cTn id="65" dur="500"/>
+                                        <p:tgtEl>
+                                          <p:spTgt spid="7">
+                                            <p:txEl>
+                                              <p:pRg st="3" end="3"/>
+                                            </p:txEl>
+                                          </p:spTgt>
+                                        </p:tgtEl>
+                                      </p:cBhvr>
+                                    </p:animEffect>
+                                  </p:childTnLst>
+                                </p:cTn>
+                              </p:par>
+                            </p:childTnLst>
+                          </p:cTn>
+                        </p:par>
+                      </p:childTnLst>
+                    </p:cTn>
+                  </p:par>
+                  <p:par>
+                    <p:cTn id="66" fill="hold">
+                      <p:stCondLst>
+                        <p:cond delay="indefinite"/>
+                      </p:stCondLst>
+                      <p:childTnLst>
+                        <p:par>
+                          <p:cTn id="67" fill="hold">
+                            <p:stCondLst>
+                              <p:cond delay="0"/>
+                            </p:stCondLst>
+                            <p:childTnLst>
+                              <p:par>
+                                <p:cTn id="68" presetID="10" presetClass="entr" presetSubtype="0" fill="hold" grpId="0" nodeType="clickEffect">
+                                  <p:stCondLst>
+                                    <p:cond delay="0"/>
+                                  </p:stCondLst>
+                                  <p:childTnLst>
+                                    <p:set>
+                                      <p:cBhvr>
+                                        <p:cTn id="69" dur="1" fill="hold">
+                                          <p:stCondLst>
+                                            <p:cond delay="0"/>
+                                          </p:stCondLst>
+                                        </p:cTn>
+                                        <p:tgtEl>
+                                          <p:spTgt spid="7">
+                                            <p:txEl>
+                                              <p:pRg st="4" end="4"/>
+                                            </p:txEl>
+                                          </p:spTgt>
+                                        </p:tgtEl>
+                                        <p:attrNameLst>
+                                          <p:attrName>style.visibility</p:attrName>
+                                        </p:attrNameLst>
+                                      </p:cBhvr>
+                                      <p:to>
+                                        <p:strVal val="visible"/>
+                                      </p:to>
+                                    </p:set>
+                                    <p:animEffect transition="in" filter="fade">
+                                      <p:cBhvr>
+                                        <p:cTn id="70" dur="500"/>
+                                        <p:tgtEl>
+                                          <p:spTgt spid="7">
+                                            <p:txEl>
+                                              <p:pRg st="4" end="4"/>
+                                            </p:txEl>
+                                          </p:spTgt>
+                                        </p:tgtEl>
+                                      </p:cBhvr>
+                                    </p:animEffect>
+                                  </p:childTnLst>
+                                </p:cTn>
+                              </p:par>
+                            </p:childTnLst>
+                          </p:cTn>
+                        </p:par>
+                      </p:childTnLst>
+                    </p:cTn>
+                  </p:par>
                 </p:childTnLst>
               </p:cTn>
               <p:prevCondLst>
@@ -5877,6 +6655,7 @@
       <p:bldP spid="13" grpId="2"/>
       <p:bldP spid="13" grpId="3"/>
       <p:bldP spid="6" grpId="0" uiExpand="1" build="p"/>
+      <p:bldP spid="7" grpId="0" build="p"/>
     </p:bldLst>
   </p:timing>
 </p:sld>
@@ -5935,7 +6714,7 @@
         <p:spPr/>
         <p:txBody>
           <a:bodyPr>
-            <a:normAutofit/>
+            <a:normAutofit fontScale="77500" lnSpcReduction="20000"/>
           </a:bodyPr>
           <a:lstStyle/>
           <a:p>
@@ -5957,6 +6736,22 @@
               <a:rPr lang="en-US" dirty="0" smtClean="0"/>
               <a:t> Karim</a:t>
             </a:r>
+          </a:p>
+          <a:p>
+            <a:r>
+              <a:rPr lang="en-US" u="sng" dirty="0" smtClean="0">
+                <a:solidFill>
+                  <a:srgbClr val="00B0F0"/>
+                </a:solidFill>
+                <a:hlinkClick r:id="rId2"/>
+              </a:rPr>
+              <a:t>alim.karim.nsu@gmail.com</a:t>
+            </a:r>
+            <a:endParaRPr lang="en-US" u="sng" dirty="0" smtClean="0">
+              <a:solidFill>
+                <a:srgbClr val="00B0F0"/>
+              </a:solidFill>
+            </a:endParaRPr>
           </a:p>
           <a:p>
             <a:r>
@@ -5965,7 +6760,17 @@
                   <a:srgbClr val="00B0F0"/>
                 </a:solidFill>
               </a:rPr>
-              <a:t>alim.karim.nsu@gmail.com</a:t>
+              <a:t>North South University</a:t>
+            </a:r>
+          </a:p>
+          <a:p>
+            <a:r>
+              <a:rPr lang="en-US" u="sng" dirty="0" smtClean="0">
+                <a:solidFill>
+                  <a:srgbClr val="00B0F0"/>
+                </a:solidFill>
+              </a:rPr>
+              <a:t>CSE 499 </a:t>
             </a:r>
           </a:p>
           <a:p>
@@ -6069,16 +6874,25 @@
     </p:spTree>
     <p:extLst>
       <p:ext uri="{BB962C8B-B14F-4D97-AF65-F5344CB8AC3E}">
-        <p14:creationId xmlns:p14="http://schemas.microsoft.com/office/powerpoint/2010/main" val="1408301175"/>
+        <p14:creationId xmlns:p14="http://schemas.microsoft.com/office/powerpoint/2010/main" val="3328098561"/>
       </p:ext>
     </p:extLst>
   </p:cSld>
   <p:clrMapOvr>
     <a:masterClrMapping/>
   </p:clrMapOvr>
-  <p:transition spd="slow">
-    <p:comb/>
-  </p:transition>
+  <mc:AlternateContent xmlns:mc="http://schemas.openxmlformats.org/markup-compatibility/2006" xmlns:p15="http://schemas.microsoft.com/office/powerpoint/2012/main">
+    <mc:Choice Requires="p15">
+      <p:transition xmlns:p14="http://schemas.microsoft.com/office/powerpoint/2010/main" spd="slow" p14:dur="2000">
+        <p15:prstTrans prst="fallOver"/>
+      </p:transition>
+    </mc:Choice>
+    <mc:Fallback xmlns="">
+      <p:transition spd="slow">
+        <p:fade/>
+      </p:transition>
+    </mc:Fallback>
+  </mc:AlternateContent>
   <p:timing>
     <p:tnLst>
       <p:par>
@@ -6479,6 +7293,59 @@
                       </p:childTnLst>
                     </p:cTn>
                   </p:par>
+                  <p:par>
+                    <p:cTn id="35" fill="hold">
+                      <p:stCondLst>
+                        <p:cond delay="indefinite"/>
+                      </p:stCondLst>
+                      <p:childTnLst>
+                        <p:par>
+                          <p:cTn id="36" fill="hold">
+                            <p:stCondLst>
+                              <p:cond delay="0"/>
+                            </p:stCondLst>
+                            <p:childTnLst>
+                              <p:par>
+                                <p:cTn id="37" presetID="22" presetClass="entr" presetSubtype="1" fill="hold" grpId="0" nodeType="clickEffect">
+                                  <p:stCondLst>
+                                    <p:cond delay="0"/>
+                                  </p:stCondLst>
+                                  <p:childTnLst>
+                                    <p:set>
+                                      <p:cBhvr>
+                                        <p:cTn id="38" dur="1" fill="hold">
+                                          <p:stCondLst>
+                                            <p:cond delay="0"/>
+                                          </p:stCondLst>
+                                        </p:cTn>
+                                        <p:tgtEl>
+                                          <p:spTgt spid="3"/>
+                                        </p:tgtEl>
+                                        <p:attrNameLst>
+                                          <p:attrName>style.visibility</p:attrName>
+                                        </p:attrNameLst>
+                                      </p:cBhvr>
+                                      <p:to>
+                                        <p:strVal val="visible"/>
+                                      </p:to>
+                                    </p:set>
+                                    <p:animEffect transition="in" filter="wipe(up)">
+                                      <p:cBhvr>
+                                        <p:cTn id="39" dur="500"/>
+                                        <p:tgtEl>
+                                          <p:spTgt spid="3"/>
+                                        </p:tgtEl>
+                                      </p:cBhvr>
+                                    </p:animEffect>
+                                  </p:childTnLst>
+                                </p:cTn>
+                              </p:par>
+                            </p:childTnLst>
+                          </p:cTn>
+                        </p:par>
+                      </p:childTnLst>
+                    </p:cTn>
+                  </p:par>
                 </p:childTnLst>
               </p:cTn>
               <p:prevCondLst>
@@ -6501,6 +7368,7 @@
       </p:par>
     </p:tnLst>
     <p:bldLst>
+      <p:bldP spid="3" grpId="0"/>
       <p:bldP spid="8" grpId="0"/>
       <p:bldP spid="8" grpId="1"/>
       <p:bldP spid="8" grpId="2"/>
@@ -6510,6 +7378,213 @@
       <p:bldP spid="6" grpId="2"/>
       <p:bldP spid="6" grpId="3"/>
     </p:bldLst>
+  </p:timing>
+</p:sld>
+</file>
+
+<file path=ppt/slides/slide13.xml><?xml version="1.0" encoding="utf-8"?>
+<p:sld xmlns:a="http://schemas.openxmlformats.org/drawingml/2006/main" xmlns:r="http://schemas.openxmlformats.org/officeDocument/2006/relationships" xmlns:p="http://schemas.openxmlformats.org/presentationml/2006/main">
+  <p:cSld>
+    <p:spTree>
+      <p:nvGrpSpPr>
+        <p:cNvPr id="1" name=""/>
+        <p:cNvGrpSpPr/>
+        <p:nvPr/>
+      </p:nvGrpSpPr>
+      <p:grpSpPr>
+        <a:xfrm>
+          <a:off x="0" y="0"/>
+          <a:ext cx="0" cy="0"/>
+          <a:chOff x="0" y="0"/>
+          <a:chExt cx="0" cy="0"/>
+        </a:xfrm>
+      </p:grpSpPr>
+      <p:sp>
+        <p:nvSpPr>
+          <p:cNvPr id="2" name="Title 1"/>
+          <p:cNvSpPr>
+            <a:spLocks noGrp="1"/>
+          </p:cNvSpPr>
+          <p:nvPr>
+            <p:ph type="ctrTitle"/>
+          </p:nvPr>
+        </p:nvSpPr>
+        <p:spPr/>
+        <p:txBody>
+          <a:bodyPr/>
+          <a:lstStyle/>
+          <a:p>
+            <a:r>
+              <a:rPr lang="en-US" dirty="0" smtClean="0"/>
+              <a:t>Thank you</a:t>
+            </a:r>
+            <a:endParaRPr lang="en-US" dirty="0"/>
+          </a:p>
+        </p:txBody>
+      </p:sp>
+      <p:sp>
+        <p:nvSpPr>
+          <p:cNvPr id="3" name="Subtitle 2"/>
+          <p:cNvSpPr>
+            <a:spLocks noGrp="1"/>
+          </p:cNvSpPr>
+          <p:nvPr>
+            <p:ph type="subTitle" idx="1"/>
+          </p:nvPr>
+        </p:nvSpPr>
+        <p:spPr/>
+        <p:txBody>
+          <a:bodyPr>
+            <a:normAutofit fontScale="77500" lnSpcReduction="20000"/>
+          </a:bodyPr>
+          <a:lstStyle/>
+          <a:p>
+            <a:r>
+              <a:rPr lang="en-US" dirty="0" smtClean="0"/>
+              <a:t>Presented by</a:t>
+            </a:r>
+          </a:p>
+          <a:p>
+            <a:r>
+              <a:rPr lang="en-US" dirty="0" smtClean="0"/>
+              <a:t>Md. Alim </a:t>
+            </a:r>
+            <a:r>
+              <a:rPr lang="en-US" dirty="0" err="1" smtClean="0"/>
+              <a:t>Ul</a:t>
+            </a:r>
+            <a:r>
+              <a:rPr lang="en-US" dirty="0" smtClean="0"/>
+              <a:t> Karim</a:t>
+            </a:r>
+          </a:p>
+          <a:p>
+            <a:r>
+              <a:rPr lang="en-US" u="sng" dirty="0" smtClean="0">
+                <a:solidFill>
+                  <a:srgbClr val="00B0F0"/>
+                </a:solidFill>
+                <a:hlinkClick r:id="rId2"/>
+              </a:rPr>
+              <a:t>alim.karim.nsu@gmail.com</a:t>
+            </a:r>
+            <a:endParaRPr lang="en-US" u="sng" dirty="0" smtClean="0">
+              <a:solidFill>
+                <a:srgbClr val="00B0F0"/>
+              </a:solidFill>
+            </a:endParaRPr>
+          </a:p>
+          <a:p>
+            <a:r>
+              <a:rPr lang="en-US" u="sng" dirty="0" smtClean="0">
+                <a:solidFill>
+                  <a:srgbClr val="00B0F0"/>
+                </a:solidFill>
+              </a:rPr>
+              <a:t>North South University</a:t>
+            </a:r>
+          </a:p>
+          <a:p>
+            <a:r>
+              <a:rPr lang="en-US" u="sng" dirty="0" smtClean="0">
+                <a:solidFill>
+                  <a:srgbClr val="00B0F0"/>
+                </a:solidFill>
+              </a:rPr>
+              <a:t>CSE 499 </a:t>
+            </a:r>
+          </a:p>
+          <a:p>
+            <a:endParaRPr lang="en-US" dirty="0" smtClean="0"/>
+          </a:p>
+        </p:txBody>
+      </p:sp>
+      <p:sp>
+        <p:nvSpPr>
+          <p:cNvPr id="7" name="Slide Number Placeholder 6"/>
+          <p:cNvSpPr>
+            <a:spLocks noGrp="1"/>
+          </p:cNvSpPr>
+          <p:nvPr>
+            <p:ph type="sldNum" sz="quarter" idx="12"/>
+          </p:nvPr>
+        </p:nvSpPr>
+        <p:spPr/>
+        <p:txBody>
+          <a:bodyPr/>
+          <a:lstStyle/>
+          <a:p>
+            <a:fld id="{3405949F-09D4-4823-AF2C-A9E8A428D48D}" type="slidenum">
+              <a:rPr lang="en-US" smtClean="0"/>
+              <a:t>13</a:t>
+            </a:fld>
+            <a:endParaRPr lang="en-US"/>
+          </a:p>
+        </p:txBody>
+      </p:sp>
+      <p:sp>
+        <p:nvSpPr>
+          <p:cNvPr id="8" name="TextBox 7"/>
+          <p:cNvSpPr txBox="1"/>
+          <p:nvPr/>
+        </p:nvSpPr>
+        <p:spPr>
+          <a:xfrm>
+            <a:off x="4533970" y="1672491"/>
+            <a:ext cx="3124060" cy="830997"/>
+          </a:xfrm>
+          <a:prstGeom prst="rect">
+            <a:avLst/>
+          </a:prstGeom>
+          <a:noFill/>
+        </p:spPr>
+        <p:txBody>
+          <a:bodyPr wrap="none" rtlCol="0">
+            <a:spAutoFit/>
+          </a:bodyPr>
+          <a:lstStyle/>
+          <a:p>
+            <a:r>
+              <a:rPr lang="en-US" sz="4800" dirty="0" smtClean="0">
+                <a:solidFill>
+                  <a:schemeClr val="bg1">
+                    <a:lumMod val="50000"/>
+                  </a:schemeClr>
+                </a:solidFill>
+              </a:rPr>
+              <a:t>Questions ?</a:t>
+            </a:r>
+          </a:p>
+        </p:txBody>
+      </p:sp>
+    </p:spTree>
+    <p:extLst>
+      <p:ext uri="{BB962C8B-B14F-4D97-AF65-F5344CB8AC3E}">
+        <p14:creationId xmlns:p14="http://schemas.microsoft.com/office/powerpoint/2010/main" val="1408301175"/>
+      </p:ext>
+    </p:extLst>
+  </p:cSld>
+  <p:clrMapOvr>
+    <a:masterClrMapping/>
+  </p:clrMapOvr>
+  <mc:AlternateContent xmlns:mc="http://schemas.openxmlformats.org/markup-compatibility/2006" xmlns:p14="http://schemas.microsoft.com/office/powerpoint/2010/main">
+    <mc:Choice Requires="p14">
+      <p:transition spd="med" p14:dur="700">
+        <p:fade/>
+      </p:transition>
+    </mc:Choice>
+    <mc:Fallback xmlns="">
+      <p:transition spd="med">
+        <p:fade/>
+      </p:transition>
+    </mc:Fallback>
+  </mc:AlternateContent>
+  <p:timing>
+    <p:tnLst>
+      <p:par>
+        <p:cTn id="1" dur="indefinite" restart="never" nodeType="tmRoot"/>
+      </p:par>
+    </p:tnLst>
   </p:timing>
 </p:sld>
 </file>
@@ -6606,31 +7681,20 @@
           <a:p>
             <a:r>
               <a:rPr lang="en-US" dirty="0" smtClean="0"/>
-              <a:t>How we are going to install it?</a:t>
+              <a:t> Proof of concepts comparing with another regular project</a:t>
             </a:r>
           </a:p>
           <a:p>
             <a:r>
               <a:rPr lang="en-US" dirty="0" smtClean="0"/>
-              <a:t>Proof of concepts comparing with another regular project</a:t>
+              <a:t>Example and test cases.</a:t>
             </a:r>
           </a:p>
           <a:p>
             <a:r>
               <a:rPr lang="en-US" dirty="0" smtClean="0"/>
-              <a:t>Example and test cases</a:t>
-            </a:r>
-            <a:r>
-              <a:rPr lang="en-US" dirty="0" smtClean="0"/>
-              <a:t>.</a:t>
-            </a:r>
-          </a:p>
-          <a:p>
-            <a:r>
-              <a:rPr lang="en-US" smtClean="0"/>
               <a:t>References </a:t>
             </a:r>
-            <a:endParaRPr lang="en-US" dirty="0" smtClean="0"/>
           </a:p>
           <a:p>
             <a:pPr marL="0" indent="0">
@@ -7116,67 +8180,6 @@
                                           <p:spTgt spid="3">
                                             <p:txEl>
                                               <p:pRg st="7" end="7"/>
-                                            </p:txEl>
-                                          </p:spTgt>
-                                        </p:tgtEl>
-                                      </p:cBhvr>
-                                    </p:animEffect>
-                                  </p:childTnLst>
-                                </p:cTn>
-                              </p:par>
-                            </p:childTnLst>
-                          </p:cTn>
-                        </p:par>
-                      </p:childTnLst>
-                    </p:cTn>
-                  </p:par>
-                  <p:par>
-                    <p:cTn id="37" fill="hold">
-                      <p:stCondLst>
-                        <p:cond delay="indefinite"/>
-                      </p:stCondLst>
-                      <p:childTnLst>
-                        <p:par>
-                          <p:cTn id="38" fill="hold">
-                            <p:stCondLst>
-                              <p:cond delay="0"/>
-                            </p:stCondLst>
-                            <p:childTnLst>
-                              <p:par>
-                                <p:cTn id="39" presetID="10" presetClass="entr" presetSubtype="0" fill="hold" grpId="0" nodeType="clickEffect">
-                                  <p:stCondLst>
-                                    <p:cond delay="0"/>
-                                  </p:stCondLst>
-                                  <p:childTnLst>
-                                    <p:set>
-                                      <p:cBhvr>
-                                        <p:cTn id="40" dur="1" fill="hold">
-                                          <p:stCondLst>
-                                            <p:cond delay="0"/>
-                                          </p:stCondLst>
-                                        </p:cTn>
-                                        <p:tgtEl>
-                                          <p:spTgt spid="3">
-                                            <p:txEl>
-                                              <p:pRg st="8" end="8"/>
-                                            </p:txEl>
-                                          </p:spTgt>
-                                        </p:tgtEl>
-                                        <p:attrNameLst>
-                                          <p:attrName>style.visibility</p:attrName>
-                                        </p:attrNameLst>
-                                      </p:cBhvr>
-                                      <p:to>
-                                        <p:strVal val="visible"/>
-                                      </p:to>
-                                    </p:set>
-                                    <p:animEffect transition="in" filter="fade">
-                                      <p:cBhvr>
-                                        <p:cTn id="41" dur="500"/>
-                                        <p:tgtEl>
-                                          <p:spTgt spid="3">
-                                            <p:txEl>
-                                              <p:pRg st="8" end="8"/>
                                             </p:txEl>
                                           </p:spTgt>
                                         </p:tgtEl>
@@ -7293,7 +8296,7 @@
         </p:nvSpPr>
         <p:spPr>
           <a:xfrm>
-            <a:off x="10493732" y="706853"/>
+            <a:off x="10493732" y="1668881"/>
             <a:ext cx="1178528" cy="400110"/>
           </a:xfrm>
           <a:prstGeom prst="rect">
@@ -7329,7 +8332,7 @@
         </p:nvSpPr>
         <p:spPr>
           <a:xfrm>
-            <a:off x="9104954" y="1657420"/>
+            <a:off x="9104954" y="396157"/>
             <a:ext cx="2567306" cy="400110"/>
           </a:xfrm>
           <a:prstGeom prst="rect">
@@ -7365,7 +8368,7 @@
         </p:nvSpPr>
         <p:spPr>
           <a:xfrm>
-            <a:off x="10969824" y="1182137"/>
+            <a:off x="10969824" y="820398"/>
             <a:ext cx="702436" cy="400110"/>
           </a:xfrm>
           <a:prstGeom prst="rect">
@@ -7514,7 +8517,7 @@
         <p:spPr>
           <a:xfrm>
             <a:off x="-127855" y="3283355"/>
-            <a:ext cx="10515600" cy="646331"/>
+            <a:ext cx="10515600" cy="560090"/>
           </a:xfrm>
           <a:prstGeom prst="rect">
             <a:avLst/>
@@ -7538,7 +8541,7 @@
               </a:spcAft>
             </a:pPr>
             <a:r>
-              <a:rPr lang="en-US" i="1" dirty="0" smtClean="0">
+              <a:rPr lang="en-US" i="1" dirty="0">
                 <a:solidFill>
                   <a:srgbClr val="206252"/>
                 </a:solidFill>
@@ -7546,7 +8549,7 @@
                 <a:ea typeface="Times New Roman" panose="02020603050405020304" pitchFamily="18" charset="0"/>
                 <a:cs typeface="SolaimanLipi" panose="02000500020000020004" pitchFamily="2" charset="0"/>
               </a:rPr>
-              <a:t>Last thing we have to remember that humans are not machine. </a:t>
+              <a:t>We have to remember that humans are not machine. </a:t>
             </a:r>
             <a:endParaRPr lang="en-US" sz="1400" dirty="0">
               <a:effectLst/>
@@ -7554,6 +8557,82 @@
               <a:ea typeface="Times New Roman" panose="02020603050405020304" pitchFamily="18" charset="0"/>
               <a:cs typeface="SolaimanLipi" panose="02000500020000020004" pitchFamily="2" charset="0"/>
             </a:endParaRPr>
+          </a:p>
+        </p:txBody>
+      </p:sp>
+      <p:sp>
+        <p:nvSpPr>
+          <p:cNvPr id="11" name="TextBox 10"/>
+          <p:cNvSpPr txBox="1"/>
+          <p:nvPr/>
+        </p:nvSpPr>
+        <p:spPr>
+          <a:xfrm>
+            <a:off x="4843210" y="1244639"/>
+            <a:ext cx="6829050" cy="400110"/>
+          </a:xfrm>
+          <a:prstGeom prst="rect">
+            <a:avLst/>
+          </a:prstGeom>
+          <a:noFill/>
+        </p:spPr>
+        <p:txBody>
+          <a:bodyPr wrap="none" rtlCol="0">
+            <a:spAutoFit/>
+          </a:bodyPr>
+          <a:lstStyle/>
+          <a:p>
+            <a:pPr algn="r"/>
+            <a:r>
+              <a:rPr lang="en-US" sz="2000" dirty="0" smtClean="0">
+                <a:solidFill>
+                  <a:schemeClr val="accent1">
+                    <a:lumMod val="75000"/>
+                  </a:schemeClr>
+                </a:solidFill>
+              </a:rPr>
+              <a:t>Keeping a close relationship between </a:t>
+            </a:r>
+            <a:r>
+              <a:rPr lang="en-US" sz="2000" b="1" i="1" dirty="0" smtClean="0">
+                <a:solidFill>
+                  <a:schemeClr val="accent1">
+                    <a:lumMod val="75000"/>
+                  </a:schemeClr>
+                </a:solidFill>
+              </a:rPr>
+              <a:t>engineers</a:t>
+            </a:r>
+            <a:r>
+              <a:rPr lang="en-US" sz="2000" dirty="0" smtClean="0">
+                <a:solidFill>
+                  <a:schemeClr val="accent1">
+                    <a:lumMod val="75000"/>
+                  </a:schemeClr>
+                </a:solidFill>
+              </a:rPr>
+              <a:t> and </a:t>
+            </a:r>
+            <a:r>
+              <a:rPr lang="en-US" sz="2000" b="1" i="1" dirty="0" smtClean="0">
+                <a:solidFill>
+                  <a:schemeClr val="accent1">
+                    <a:lumMod val="75000"/>
+                  </a:schemeClr>
+                </a:solidFill>
+              </a:rPr>
+              <a:t>developers</a:t>
+            </a:r>
+            <a:r>
+              <a:rPr lang="en-US" sz="2000" dirty="0" smtClean="0">
+                <a:solidFill>
+                  <a:schemeClr val="accent1">
+                    <a:lumMod val="75000"/>
+                  </a:schemeClr>
+                </a:solidFill>
+              </a:rPr>
+              <a:t>.</a:t>
+            </a:r>
           </a:p>
         </p:txBody>
       </p:sp>
@@ -7616,7 +8695,7 @@
                                           </p:stCondLst>
                                         </p:cTn>
                                         <p:tgtEl>
-                                          <p:spTgt spid="7"/>
+                                          <p:spTgt spid="9"/>
                                         </p:tgtEl>
                                         <p:attrNameLst>
                                           <p:attrName>style.visibility</p:attrName>
@@ -7630,7 +8709,7 @@
                                       <p:cBhvr>
                                         <p:cTn id="7" dur="500"/>
                                         <p:tgtEl>
-                                          <p:spTgt spid="7"/>
+                                          <p:spTgt spid="9"/>
                                         </p:tgtEl>
                                       </p:cBhvr>
                                     </p:animEffect>
@@ -7650,7 +8729,7 @@
                                       <p:cBhvr override="childStyle">
                                         <p:cTn id="9" dur="900" fill="hold"/>
                                         <p:tgtEl>
-                                          <p:spTgt spid="7"/>
+                                          <p:spTgt spid="9"/>
                                         </p:tgtEl>
                                         <p:attrNameLst>
                                           <p:attrName>style.color</p:attrName>
@@ -7676,7 +8755,7 @@
                                       <p:cBhvr override="childStyle">
                                         <p:cTn id="11" dur="4800"/>
                                         <p:tgtEl>
-                                          <p:spTgt spid="7"/>
+                                          <p:spTgt spid="9"/>
                                         </p:tgtEl>
                                         <p:attrNameLst>
                                           <p:attrName>style.fontWeight</p:attrName>
@@ -7720,7 +8799,7 @@
                                       <p:cBhvr override="childStyle">
                                         <p:cTn id="15" dur="1000" fill="hold"/>
                                         <p:tgtEl>
-                                          <p:spTgt spid="7"/>
+                                          <p:spTgt spid="9"/>
                                         </p:tgtEl>
                                         <p:attrNameLst>
                                           <p:attrName>style.color</p:attrName>
@@ -7768,7 +8847,7 @@
                                           </p:stCondLst>
                                         </p:cTn>
                                         <p:tgtEl>
-                                          <p:spTgt spid="12">
+                                          <p:spTgt spid="14">
                                             <p:txEl>
                                               <p:pRg st="0" end="0"/>
                                             </p:txEl>
@@ -7786,7 +8865,7 @@
                                       <p:cBhvr>
                                         <p:cTn id="20" dur="200"/>
                                         <p:tgtEl>
-                                          <p:spTgt spid="12">
+                                          <p:spTgt spid="14">
                                             <p:txEl>
                                               <p:pRg st="0" end="0"/>
                                             </p:txEl>
@@ -7810,7 +8889,7 @@
                                       <p:cBhvr override="childStyle">
                                         <p:cTn id="22" dur="600"/>
                                         <p:tgtEl>
-                                          <p:spTgt spid="12">
+                                          <p:spTgt spid="14">
                                             <p:txEl>
                                               <p:pRg st="0" end="0"/>
                                             </p:txEl>
@@ -7858,7 +8937,7 @@
                                       <p:cBhvr>
                                         <p:cTn id="26" dur="500"/>
                                         <p:tgtEl>
-                                          <p:spTgt spid="12">
+                                          <p:spTgt spid="14">
                                             <p:txEl>
                                               <p:pRg st="0" end="0"/>
                                             </p:txEl>
@@ -7874,7 +8953,7 @@
                                           </p:stCondLst>
                                         </p:cTn>
                                         <p:tgtEl>
-                                          <p:spTgt spid="12">
+                                          <p:spTgt spid="14">
                                             <p:txEl>
                                               <p:pRg st="0" end="0"/>
                                             </p:txEl>
@@ -8236,7 +9315,7 @@
                                           </p:stCondLst>
                                         </p:cTn>
                                         <p:tgtEl>
-                                          <p:spTgt spid="9"/>
+                                          <p:spTgt spid="11"/>
                                         </p:tgtEl>
                                         <p:attrNameLst>
                                           <p:attrName>style.visibility</p:attrName>
@@ -8250,7 +9329,7 @@
                                       <p:cBhvr>
                                         <p:cTn id="57" dur="500"/>
                                         <p:tgtEl>
-                                          <p:spTgt spid="9"/>
+                                          <p:spTgt spid="11"/>
                                         </p:tgtEl>
                                       </p:cBhvr>
                                     </p:animEffect>
@@ -8270,7 +9349,7 @@
                                       <p:cBhvr override="childStyle">
                                         <p:cTn id="59" dur="900" fill="hold"/>
                                         <p:tgtEl>
-                                          <p:spTgt spid="9"/>
+                                          <p:spTgt spid="11"/>
                                         </p:tgtEl>
                                         <p:attrNameLst>
                                           <p:attrName>style.color</p:attrName>
@@ -8296,7 +9375,7 @@
                                       <p:cBhvr override="childStyle">
                                         <p:cTn id="61" dur="4800"/>
                                         <p:tgtEl>
-                                          <p:spTgt spid="9"/>
+                                          <p:spTgt spid="11"/>
                                         </p:tgtEl>
                                         <p:attrNameLst>
                                           <p:attrName>style.fontWeight</p:attrName>
@@ -8340,7 +9419,7 @@
                                       <p:cBhvr override="childStyle">
                                         <p:cTn id="65" dur="1000" fill="hold"/>
                                         <p:tgtEl>
-                                          <p:spTgt spid="9"/>
+                                          <p:spTgt spid="11"/>
                                         </p:tgtEl>
                                         <p:attrNameLst>
                                           <p:attrName>style.color</p:attrName>
@@ -8388,11 +9467,7 @@
                                           </p:stCondLst>
                                         </p:cTn>
                                         <p:tgtEl>
-                                          <p:spTgt spid="14">
-                                            <p:txEl>
-                                              <p:pRg st="0" end="0"/>
-                                            </p:txEl>
-                                          </p:spTgt>
+                                          <p:spTgt spid="7"/>
                                         </p:tgtEl>
                                         <p:attrNameLst>
                                           <p:attrName>style.visibility</p:attrName>
@@ -8404,13 +9479,9 @@
                                     </p:set>
                                     <p:animEffect transition="in" filter="fade">
                                       <p:cBhvr>
-                                        <p:cTn id="70" dur="200"/>
-                                        <p:tgtEl>
-                                          <p:spTgt spid="14">
-                                            <p:txEl>
-                                              <p:pRg st="0" end="0"/>
-                                            </p:txEl>
-                                          </p:spTgt>
+                                        <p:cTn id="70" dur="500"/>
+                                        <p:tgtEl>
+                                          <p:spTgt spid="7"/>
                                         </p:tgtEl>
                                       </p:cBhvr>
                                     </p:animEffect>
@@ -8418,23 +9489,45 @@
                                 </p:cTn>
                               </p:par>
                               <p:par>
-                                <p:cTn id="71" presetID="15" presetClass="emph" presetSubtype="0" grpId="1" nodeType="withEffect">
+                                <p:cTn id="71" presetID="3" presetClass="emph" presetSubtype="2" fill="hold" grpId="1" nodeType="withEffect">
                                   <p:stCondLst>
-                                    <p:cond delay="400"/>
+                                    <p:cond delay="0"/>
                                   </p:stCondLst>
                                   <p:iterate type="lt">
-                                    <p:tmAbs val="15"/>
+                                    <p:tmPct val="0"/>
+                                  </p:iterate>
+                                  <p:childTnLst>
+                                    <p:animClr clrSpc="rgb" dir="cw">
+                                      <p:cBhvr override="childStyle">
+                                        <p:cTn id="72" dur="900" fill="hold"/>
+                                        <p:tgtEl>
+                                          <p:spTgt spid="7"/>
+                                        </p:tgtEl>
+                                        <p:attrNameLst>
+                                          <p:attrName>style.color</p:attrName>
+                                        </p:attrNameLst>
+                                      </p:cBhvr>
+                                      <p:to>
+                                        <a:srgbClr val="FF0000"/>
+                                      </p:to>
+                                    </p:animClr>
+                                  </p:childTnLst>
+                                </p:cTn>
+                              </p:par>
+                              <p:par>
+                                <p:cTn id="73" presetID="15" presetClass="emph" presetSubtype="0" grpId="3" nodeType="withEffect">
+                                  <p:stCondLst>
+                                    <p:cond delay="0"/>
+                                  </p:stCondLst>
+                                  <p:iterate type="lt">
+                                    <p:tmAbs val="25"/>
                                   </p:iterate>
                                   <p:childTnLst>
                                     <p:set>
                                       <p:cBhvr override="childStyle">
-                                        <p:cTn id="72" dur="600"/>
-                                        <p:tgtEl>
-                                          <p:spTgt spid="14">
-                                            <p:txEl>
-                                              <p:pRg st="0" end="0"/>
-                                            </p:txEl>
-                                          </p:spTgt>
+                                        <p:cTn id="74" dur="4800"/>
+                                        <p:tgtEl>
+                                          <p:spTgt spid="7"/>
                                         </p:tgtEl>
                                         <p:attrNameLst>
                                           <p:attrName>style.fontWeight</p:attrName>
@@ -8454,19 +9547,157 @@
                     </p:cTn>
                   </p:par>
                   <p:par>
-                    <p:cTn id="73" fill="hold">
+                    <p:cTn id="75" fill="hold">
                       <p:stCondLst>
                         <p:cond delay="indefinite"/>
                       </p:stCondLst>
                       <p:childTnLst>
                         <p:par>
-                          <p:cTn id="74" fill="hold">
+                          <p:cTn id="76" fill="hold">
                             <p:stCondLst>
                               <p:cond delay="0"/>
                             </p:stCondLst>
                             <p:childTnLst>
                               <p:par>
-                                <p:cTn id="75" presetID="10" presetClass="exit" presetSubtype="0" fill="hold" grpId="2" nodeType="clickEffect">
+                                <p:cTn id="77" presetID="3" presetClass="emph" presetSubtype="2" fill="hold" grpId="2" nodeType="clickEffect">
+                                  <p:stCondLst>
+                                    <p:cond delay="0"/>
+                                  </p:stCondLst>
+                                  <p:iterate type="lt">
+                                    <p:tmPct val="0"/>
+                                  </p:iterate>
+                                  <p:childTnLst>
+                                    <p:animClr clrSpc="rgb" dir="cw">
+                                      <p:cBhvr override="childStyle">
+                                        <p:cTn id="78" dur="1000" fill="hold"/>
+                                        <p:tgtEl>
+                                          <p:spTgt spid="7"/>
+                                        </p:tgtEl>
+                                        <p:attrNameLst>
+                                          <p:attrName>style.color</p:attrName>
+                                        </p:attrNameLst>
+                                      </p:cBhvr>
+                                      <p:to>
+                                        <a:srgbClr val="00B0F0"/>
+                                      </p:to>
+                                    </p:animClr>
+                                  </p:childTnLst>
+                                </p:cTn>
+                              </p:par>
+                            </p:childTnLst>
+                          </p:cTn>
+                        </p:par>
+                      </p:childTnLst>
+                    </p:cTn>
+                  </p:par>
+                  <p:par>
+                    <p:cTn id="79" fill="hold">
+                      <p:stCondLst>
+                        <p:cond delay="indefinite"/>
+                      </p:stCondLst>
+                      <p:childTnLst>
+                        <p:par>
+                          <p:cTn id="80" fill="hold">
+                            <p:stCondLst>
+                              <p:cond delay="0"/>
+                            </p:stCondLst>
+                            <p:childTnLst>
+                              <p:par>
+                                <p:cTn id="81" presetID="10" presetClass="entr" presetSubtype="0" fill="hold" grpId="0" nodeType="clickEffect">
+                                  <p:stCondLst>
+                                    <p:cond delay="0"/>
+                                  </p:stCondLst>
+                                  <p:iterate type="lt">
+                                    <p:tmPct val="0"/>
+                                  </p:iterate>
+                                  <p:childTnLst>
+                                    <p:set>
+                                      <p:cBhvr>
+                                        <p:cTn id="82" dur="1" fill="hold">
+                                          <p:stCondLst>
+                                            <p:cond delay="0"/>
+                                          </p:stCondLst>
+                                        </p:cTn>
+                                        <p:tgtEl>
+                                          <p:spTgt spid="12">
+                                            <p:txEl>
+                                              <p:pRg st="0" end="0"/>
+                                            </p:txEl>
+                                          </p:spTgt>
+                                        </p:tgtEl>
+                                        <p:attrNameLst>
+                                          <p:attrName>style.visibility</p:attrName>
+                                        </p:attrNameLst>
+                                      </p:cBhvr>
+                                      <p:to>
+                                        <p:strVal val="visible"/>
+                                      </p:to>
+                                    </p:set>
+                                    <p:animEffect transition="in" filter="fade">
+                                      <p:cBhvr>
+                                        <p:cTn id="83" dur="200"/>
+                                        <p:tgtEl>
+                                          <p:spTgt spid="12">
+                                            <p:txEl>
+                                              <p:pRg st="0" end="0"/>
+                                            </p:txEl>
+                                          </p:spTgt>
+                                        </p:tgtEl>
+                                      </p:cBhvr>
+                                    </p:animEffect>
+                                  </p:childTnLst>
+                                </p:cTn>
+                              </p:par>
+                              <p:par>
+                                <p:cTn id="84" presetID="15" presetClass="emph" presetSubtype="0" grpId="1" nodeType="withEffect">
+                                  <p:stCondLst>
+                                    <p:cond delay="400"/>
+                                  </p:stCondLst>
+                                  <p:iterate type="lt">
+                                    <p:tmAbs val="15"/>
+                                  </p:iterate>
+                                  <p:childTnLst>
+                                    <p:set>
+                                      <p:cBhvr override="childStyle">
+                                        <p:cTn id="85" dur="600"/>
+                                        <p:tgtEl>
+                                          <p:spTgt spid="12">
+                                            <p:txEl>
+                                              <p:pRg st="0" end="0"/>
+                                            </p:txEl>
+                                          </p:spTgt>
+                                        </p:tgtEl>
+                                        <p:attrNameLst>
+                                          <p:attrName>style.fontWeight</p:attrName>
+                                        </p:attrNameLst>
+                                      </p:cBhvr>
+                                      <p:to>
+                                        <p:strVal val="bold"/>
+                                      </p:to>
+                                    </p:set>
+                                  </p:childTnLst>
+                                </p:cTn>
+                              </p:par>
+                            </p:childTnLst>
+                          </p:cTn>
+                        </p:par>
+                      </p:childTnLst>
+                    </p:cTn>
+                  </p:par>
+                  <p:par>
+                    <p:cTn id="86" fill="hold">
+                      <p:stCondLst>
+                        <p:cond delay="indefinite"/>
+                      </p:stCondLst>
+                      <p:childTnLst>
+                        <p:par>
+                          <p:cTn id="87" fill="hold">
+                            <p:stCondLst>
+                              <p:cond delay="0"/>
+                            </p:stCondLst>
+                            <p:childTnLst>
+                              <p:par>
+                                <p:cTn id="88" presetID="10" presetClass="exit" presetSubtype="0" fill="hold" grpId="2" nodeType="clickEffect">
                                   <p:stCondLst>
                                     <p:cond delay="0"/>
                                   </p:stCondLst>
@@ -8476,9 +9707,9 @@
                                   <p:childTnLst>
                                     <p:animEffect transition="out" filter="fade">
                                       <p:cBhvr>
-                                        <p:cTn id="76" dur="500"/>
-                                        <p:tgtEl>
-                                          <p:spTgt spid="14">
+                                        <p:cTn id="89" dur="500"/>
+                                        <p:tgtEl>
+                                          <p:spTgt spid="12">
                                             <p:txEl>
                                               <p:pRg st="0" end="0"/>
                                             </p:txEl>
@@ -8488,13 +9719,13 @@
                                     </p:animEffect>
                                     <p:set>
                                       <p:cBhvr>
-                                        <p:cTn id="77" dur="1" fill="hold">
+                                        <p:cTn id="90" dur="1" fill="hold">
                                           <p:stCondLst>
                                             <p:cond delay="499"/>
                                           </p:stCondLst>
                                         </p:cTn>
                                         <p:tgtEl>
-                                          <p:spTgt spid="14">
+                                          <p:spTgt spid="12">
                                             <p:txEl>
                                               <p:pRg st="0" end="0"/>
                                             </p:txEl>
@@ -8560,6 +9791,10 @@
       <p:bldP spid="14" grpId="0" build="allAtOnce"/>
       <p:bldP spid="14" grpId="1" build="allAtOnce"/>
       <p:bldP spid="14" grpId="2" build="allAtOnce"/>
+      <p:bldP spid="11" grpId="0"/>
+      <p:bldP spid="11" grpId="1"/>
+      <p:bldP spid="11" grpId="2"/>
+      <p:bldP spid="11" grpId="3"/>
     </p:bldLst>
   </p:timing>
 </p:sld>
@@ -9003,49 +10238,6 @@
               </a:rPr>
               <a:t>Error logs on each occurrence.</a:t>
             </a:r>
-          </a:p>
-        </p:txBody>
-      </p:sp>
-      <p:sp>
-        <p:nvSpPr>
-          <p:cNvPr id="17" name="TextBox 16"/>
-          <p:cNvSpPr txBox="1"/>
-          <p:nvPr/>
-        </p:nvSpPr>
-        <p:spPr>
-          <a:xfrm>
-            <a:off x="8534412" y="2928055"/>
-            <a:ext cx="3137847" cy="400110"/>
-          </a:xfrm>
-          <a:prstGeom prst="rect">
-            <a:avLst/>
-          </a:prstGeom>
-          <a:noFill/>
-        </p:spPr>
-        <p:txBody>
-          <a:bodyPr wrap="none" rtlCol="0">
-            <a:spAutoFit/>
-          </a:bodyPr>
-          <a:lstStyle/>
-          <a:p>
-            <a:pPr algn="r"/>
-            <a:r>
-              <a:rPr lang="en-US" sz="2000" dirty="0">
-                <a:solidFill>
-                  <a:schemeClr val="accent1">
-                    <a:lumMod val="75000"/>
-                  </a:schemeClr>
-                </a:solidFill>
-              </a:rPr>
-              <a:t>OWASP Top Ten Cheat Sheet</a:t>
-            </a:r>
-            <a:endParaRPr lang="en-US" sz="2000" dirty="0" smtClean="0">
-              <a:solidFill>
-                <a:schemeClr val="accent1">
-                  <a:lumMod val="75000"/>
-                </a:schemeClr>
-              </a:solidFill>
-            </a:endParaRPr>
           </a:p>
         </p:txBody>
       </p:sp>
@@ -10259,158 +11451,6 @@
                                         <p:cTn id="99" dur="1000" fill="hold"/>
                                         <p:tgtEl>
                                           <p:spTgt spid="16"/>
-                                        </p:tgtEl>
-                                        <p:attrNameLst>
-                                          <p:attrName>style.color</p:attrName>
-                                        </p:attrNameLst>
-                                      </p:cBhvr>
-                                      <p:to>
-                                        <a:srgbClr val="00B0F0"/>
-                                      </p:to>
-                                    </p:animClr>
-                                  </p:childTnLst>
-                                </p:cTn>
-                              </p:par>
-                            </p:childTnLst>
-                          </p:cTn>
-                        </p:par>
-                      </p:childTnLst>
-                    </p:cTn>
-                  </p:par>
-                  <p:par>
-                    <p:cTn id="100" fill="hold">
-                      <p:stCondLst>
-                        <p:cond delay="indefinite"/>
-                      </p:stCondLst>
-                      <p:childTnLst>
-                        <p:par>
-                          <p:cTn id="101" fill="hold">
-                            <p:stCondLst>
-                              <p:cond delay="0"/>
-                            </p:stCondLst>
-                            <p:childTnLst>
-                              <p:par>
-                                <p:cTn id="102" presetID="10" presetClass="entr" presetSubtype="0" fill="hold" grpId="0" nodeType="clickEffect">
-                                  <p:stCondLst>
-                                    <p:cond delay="0"/>
-                                  </p:stCondLst>
-                                  <p:iterate type="lt">
-                                    <p:tmPct val="0"/>
-                                  </p:iterate>
-                                  <p:childTnLst>
-                                    <p:set>
-                                      <p:cBhvr>
-                                        <p:cTn id="103" dur="1" fill="hold">
-                                          <p:stCondLst>
-                                            <p:cond delay="0"/>
-                                          </p:stCondLst>
-                                        </p:cTn>
-                                        <p:tgtEl>
-                                          <p:spTgt spid="17"/>
-                                        </p:tgtEl>
-                                        <p:attrNameLst>
-                                          <p:attrName>style.visibility</p:attrName>
-                                        </p:attrNameLst>
-                                      </p:cBhvr>
-                                      <p:to>
-                                        <p:strVal val="visible"/>
-                                      </p:to>
-                                    </p:set>
-                                    <p:animEffect transition="in" filter="fade">
-                                      <p:cBhvr>
-                                        <p:cTn id="104" dur="500"/>
-                                        <p:tgtEl>
-                                          <p:spTgt spid="17"/>
-                                        </p:tgtEl>
-                                      </p:cBhvr>
-                                    </p:animEffect>
-                                  </p:childTnLst>
-                                </p:cTn>
-                              </p:par>
-                              <p:par>
-                                <p:cTn id="105" presetID="3" presetClass="emph" presetSubtype="2" fill="hold" grpId="1" nodeType="withEffect">
-                                  <p:stCondLst>
-                                    <p:cond delay="0"/>
-                                  </p:stCondLst>
-                                  <p:iterate type="lt">
-                                    <p:tmPct val="0"/>
-                                  </p:iterate>
-                                  <p:childTnLst>
-                                    <p:animClr clrSpc="rgb" dir="cw">
-                                      <p:cBhvr override="childStyle">
-                                        <p:cTn id="106" dur="900" fill="hold"/>
-                                        <p:tgtEl>
-                                          <p:spTgt spid="17"/>
-                                        </p:tgtEl>
-                                        <p:attrNameLst>
-                                          <p:attrName>style.color</p:attrName>
-                                        </p:attrNameLst>
-                                      </p:cBhvr>
-                                      <p:to>
-                                        <a:srgbClr val="FF0000"/>
-                                      </p:to>
-                                    </p:animClr>
-                                  </p:childTnLst>
-                                </p:cTn>
-                              </p:par>
-                              <p:par>
-                                <p:cTn id="107" presetID="15" presetClass="emph" presetSubtype="0" grpId="3" nodeType="withEffect">
-                                  <p:stCondLst>
-                                    <p:cond delay="0"/>
-                                  </p:stCondLst>
-                                  <p:iterate type="lt">
-                                    <p:tmAbs val="25"/>
-                                  </p:iterate>
-                                  <p:childTnLst>
-                                    <p:set>
-                                      <p:cBhvr override="childStyle">
-                                        <p:cTn id="108" dur="4800"/>
-                                        <p:tgtEl>
-                                          <p:spTgt spid="17"/>
-                                        </p:tgtEl>
-                                        <p:attrNameLst>
-                                          <p:attrName>style.fontWeight</p:attrName>
-                                        </p:attrNameLst>
-                                      </p:cBhvr>
-                                      <p:to>
-                                        <p:strVal val="bold"/>
-                                      </p:to>
-                                    </p:set>
-                                  </p:childTnLst>
-                                </p:cTn>
-                              </p:par>
-                            </p:childTnLst>
-                          </p:cTn>
-                        </p:par>
-                      </p:childTnLst>
-                    </p:cTn>
-                  </p:par>
-                  <p:par>
-                    <p:cTn id="109" fill="hold">
-                      <p:stCondLst>
-                        <p:cond delay="indefinite"/>
-                      </p:stCondLst>
-                      <p:childTnLst>
-                        <p:par>
-                          <p:cTn id="110" fill="hold">
-                            <p:stCondLst>
-                              <p:cond delay="0"/>
-                            </p:stCondLst>
-                            <p:childTnLst>
-                              <p:par>
-                                <p:cTn id="111" presetID="3" presetClass="emph" presetSubtype="2" fill="hold" grpId="2" nodeType="clickEffect">
-                                  <p:stCondLst>
-                                    <p:cond delay="0"/>
-                                  </p:stCondLst>
-                                  <p:iterate type="lt">
-                                    <p:tmPct val="0"/>
-                                  </p:iterate>
-                                  <p:childTnLst>
-                                    <p:animClr clrSpc="rgb" dir="cw">
-                                      <p:cBhvr override="childStyle">
-                                        <p:cTn id="112" dur="1000" fill="hold"/>
-                                        <p:tgtEl>
-                                          <p:spTgt spid="17"/>
                                         </p:tgtEl>
                                         <p:attrNameLst>
                                           <p:attrName>style.color</p:attrName>
@@ -10480,10 +11520,6 @@
       <p:bldP spid="16" grpId="1"/>
       <p:bldP spid="16" grpId="2"/>
       <p:bldP spid="16" grpId="3"/>
-      <p:bldP spid="17" grpId="0"/>
-      <p:bldP spid="17" grpId="1"/>
-      <p:bldP spid="17" grpId="2"/>
-      <p:bldP spid="17" grpId="3"/>
     </p:bldLst>
   </p:timing>
 </p:sld>
@@ -12967,7 +14003,7 @@
         </p:nvSpPr>
         <p:spPr>
           <a:xfrm>
-            <a:off x="831850" y="350825"/>
+            <a:off x="831850" y="156515"/>
             <a:ext cx="1922578" cy="369332"/>
           </a:xfrm>
           <a:prstGeom prst="rect">
@@ -13012,7 +14048,7 @@
         </p:nvSpPr>
         <p:spPr>
           <a:xfrm>
-            <a:off x="6260258" y="350825"/>
+            <a:off x="6260258" y="156515"/>
             <a:ext cx="1120563" cy="369332"/>
           </a:xfrm>
           <a:prstGeom prst="rect">
@@ -13077,8 +14113,8 @@
         </p:nvSpPr>
         <p:spPr>
           <a:xfrm>
-            <a:off x="831849" y="788316"/>
-            <a:ext cx="4644173" cy="3139321"/>
+            <a:off x="831849" y="536856"/>
+            <a:ext cx="4644173" cy="3416320"/>
           </a:xfrm>
           <a:prstGeom prst="rect">
             <a:avLst/>
@@ -13105,7 +14141,11 @@
             </a:pPr>
             <a:r>
               <a:rPr lang="en-US" dirty="0" smtClean="0"/>
-              <a:t>Less additional frameworks</a:t>
+              <a:t>Great registration system</a:t>
+            </a:r>
+            <a:r>
+              <a:rPr lang="en-US" dirty="0" smtClean="0"/>
+              <a:t>.</a:t>
             </a:r>
           </a:p>
           <a:p>
@@ -13114,7 +14154,11 @@
             </a:pPr>
             <a:r>
               <a:rPr lang="en-US" dirty="0" smtClean="0"/>
-              <a:t>Tons of components</a:t>
+              <a:t>Faster </a:t>
+            </a:r>
+            <a:r>
+              <a:rPr lang="en-US" dirty="0" smtClean="0"/>
+              <a:t>integration</a:t>
             </a:r>
           </a:p>
           <a:p>
@@ -13123,7 +14167,15 @@
             </a:pPr>
             <a:r>
               <a:rPr lang="en-US" dirty="0" smtClean="0"/>
-              <a:t>Faster integration</a:t>
+              <a:t>Web Optimization Out of the box (</a:t>
+            </a:r>
+            <a:r>
+              <a:rPr lang="en-US" dirty="0" err="1" smtClean="0"/>
+              <a:t>YSlow</a:t>
+            </a:r>
+            <a:r>
+              <a:rPr lang="en-US" dirty="0" smtClean="0"/>
+              <a:t>)</a:t>
             </a:r>
           </a:p>
           <a:p>
@@ -13132,35 +14184,8 @@
             </a:pPr>
             <a:r>
               <a:rPr lang="en-US" dirty="0" smtClean="0"/>
-              <a:t>Web Optimization (</a:t>
-            </a:r>
-            <a:r>
-              <a:rPr lang="en-US" dirty="0" err="1" smtClean="0"/>
-              <a:t>YSlow</a:t>
-            </a:r>
-            <a:r>
-              <a:rPr lang="en-US" dirty="0" smtClean="0"/>
-              <a:t>)</a:t>
-            </a:r>
-          </a:p>
-          <a:p>
-            <a:pPr marL="342900" indent="-342900">
-              <a:buAutoNum type="arabicPeriod"/>
-            </a:pPr>
-            <a:r>
-              <a:rPr lang="en-US" dirty="0" smtClean="0"/>
-              <a:t>OSAWP Security</a:t>
-            </a:r>
-          </a:p>
-          <a:p>
-            <a:pPr marL="342900" indent="-342900">
-              <a:buAutoNum type="arabicPeriod"/>
-            </a:pPr>
-            <a:r>
-              <a:rPr lang="en-US" dirty="0" smtClean="0"/>
               <a:t>Robust scaffolding.</a:t>
             </a:r>
-            <a:endParaRPr lang="en-US" dirty="0"/>
           </a:p>
           <a:p>
             <a:pPr marL="342900" indent="-342900">
@@ -13169,11 +14194,61 @@
             </a:pPr>
             <a:r>
               <a:rPr lang="en-US" dirty="0"/>
-              <a:t>Cache things out of the box</a:t>
+              <a:t>Tons of </a:t>
+            </a:r>
+            <a:r>
+              <a:rPr lang="en-US" dirty="0" smtClean="0"/>
+              <a:t>components (Combo, </a:t>
+            </a:r>
+            <a:r>
+              <a:rPr lang="en-US" dirty="0" err="1" smtClean="0"/>
+              <a:t>DateTime</a:t>
+            </a:r>
+            <a:r>
+              <a:rPr lang="en-US" dirty="0" smtClean="0"/>
+              <a:t>…)</a:t>
+            </a:r>
+          </a:p>
+          <a:p>
+            <a:pPr marL="342900" indent="-342900">
+              <a:buFontTx/>
+              <a:buAutoNum type="arabicPeriod"/>
+            </a:pPr>
+            <a:r>
+              <a:rPr lang="en-US" dirty="0" smtClean="0"/>
+              <a:t>Cache </a:t>
+            </a:r>
+            <a:r>
+              <a:rPr lang="en-US" dirty="0"/>
+              <a:t>things out of the box</a:t>
             </a:r>
             <a:r>
               <a:rPr lang="en-US" dirty="0" smtClean="0"/>
               <a:t>.</a:t>
+            </a:r>
+          </a:p>
+          <a:p>
+            <a:pPr marL="342900" indent="-342900">
+              <a:buFontTx/>
+              <a:buAutoNum type="arabicPeriod"/>
+            </a:pPr>
+            <a:r>
+              <a:rPr lang="en-US" dirty="0" err="1" smtClean="0"/>
+              <a:t>DevMvcComponent</a:t>
+            </a:r>
+            <a:r>
+              <a:rPr lang="en-US" dirty="0" smtClean="0"/>
+              <a:t> integration.</a:t>
+            </a:r>
+          </a:p>
+          <a:p>
+            <a:pPr marL="342900" indent="-342900">
+              <a:buFontTx/>
+              <a:buAutoNum type="arabicPeriod"/>
+            </a:pPr>
+            <a:r>
+              <a:rPr lang="en-US" dirty="0" smtClean="0"/>
+              <a:t>IP to country detection.</a:t>
             </a:r>
           </a:p>
           <a:p>
@@ -13220,8 +14295,8 @@
         </p:nvSpPr>
         <p:spPr>
           <a:xfrm>
-            <a:off x="6089650" y="788316"/>
-            <a:ext cx="4644173" cy="3139321"/>
+            <a:off x="6089650" y="536856"/>
+            <a:ext cx="5820410" cy="3416320"/>
           </a:xfrm>
           <a:prstGeom prst="rect">
             <a:avLst/>
@@ -13269,26 +14344,49 @@
                   <a:srgbClr val="FF0000"/>
                 </a:solidFill>
               </a:rPr>
-              <a:t>NO ! </a:t>
-            </a:r>
-            <a:r>
-              <a:rPr lang="en-US" dirty="0" smtClean="0"/>
-              <a:t>Additional styling framework</a:t>
-            </a:r>
-          </a:p>
-          <a:p>
-            <a:pPr marL="342900" indent="-342900">
-              <a:buAutoNum type="arabicPeriod"/>
-            </a:pPr>
-            <a:r>
-              <a:rPr lang="en-US" dirty="0" smtClean="0">
+              <a:t>No registration </a:t>
+            </a:r>
+            <a:r>
+              <a:rPr lang="en-US" smtClean="0">
                 <a:solidFill>
                   <a:srgbClr val="FF0000"/>
                 </a:solidFill>
               </a:rPr>
-              <a:t>No existing component.</a:t>
-            </a:r>
-            <a:endParaRPr lang="en-US" dirty="0" smtClean="0"/>
+              <a:t>system</a:t>
+            </a:r>
+            <a:r>
+              <a:rPr lang="en-US" smtClean="0">
+                <a:solidFill>
+                  <a:srgbClr val="FF0000"/>
+                </a:solidFill>
+              </a:rPr>
+              <a:t>.</a:t>
+            </a:r>
+          </a:p>
+          <a:p>
+            <a:pPr marL="342900" indent="-342900">
+              <a:buAutoNum type="arabicPeriod"/>
+            </a:pPr>
+            <a:r>
+              <a:rPr lang="en-US" smtClean="0">
+                <a:solidFill>
+                  <a:srgbClr val="FF0000"/>
+                </a:solidFill>
+              </a:rPr>
+              <a:t>NO </a:t>
+            </a:r>
+            <a:r>
+              <a:rPr lang="en-US" dirty="0">
+                <a:solidFill>
+                  <a:srgbClr val="FF0000"/>
+                </a:solidFill>
+              </a:rPr>
+              <a:t>! </a:t>
+            </a:r>
+            <a:r>
+              <a:rPr lang="en-US" dirty="0" smtClean="0"/>
+              <a:t>Faster integration</a:t>
+            </a:r>
           </a:p>
           <a:p>
             <a:pPr marL="342900" indent="-342900">
@@ -13304,28 +14402,37 @@
             </a:r>
             <a:r>
               <a:rPr lang="en-US" dirty="0" smtClean="0"/>
-              <a:t>Faster integration</a:t>
+              <a:t>Web Optimization is not integrated out of the box.</a:t>
             </a:r>
           </a:p>
           <a:p>
             <a:pPr marL="342900" indent="-342900">
               <a:buAutoNum type="arabicPeriod"/>
             </a:pPr>
+            <a:r>
+              <a:rPr lang="en-US" dirty="0" smtClean="0">
+                <a:solidFill>
+                  <a:srgbClr val="FF0000"/>
+                </a:solidFill>
+              </a:rPr>
+              <a:t>NO </a:t>
+            </a:r>
             <a:r>
               <a:rPr lang="en-US" dirty="0">
                 <a:solidFill>
                   <a:srgbClr val="FF0000"/>
                 </a:solidFill>
               </a:rPr>
-              <a:t>NO ! </a:t>
+              <a:t>! </a:t>
             </a:r>
             <a:r>
               <a:rPr lang="en-US" dirty="0" smtClean="0"/>
-              <a:t>Web Optimization</a:t>
+              <a:t>Robust scaffolding.</a:t>
             </a:r>
           </a:p>
           <a:p>
             <a:pPr marL="342900" indent="-342900">
+              <a:buFontTx/>
               <a:buAutoNum type="arabicPeriod"/>
             </a:pPr>
             <a:r>
@@ -13334,28 +14441,45 @@
                   <a:srgbClr val="FF0000"/>
                 </a:solidFill>
               </a:rPr>
-              <a:t>NO ! </a:t>
-            </a:r>
-            <a:r>
-              <a:rPr lang="en-US" dirty="0" smtClean="0"/>
-              <a:t>OSAWP Security</a:t>
+              <a:t>No existing component</a:t>
+            </a:r>
+            <a:r>
+              <a:rPr lang="en-US" dirty="0" smtClean="0">
+                <a:solidFill>
+                  <a:srgbClr val="FF0000"/>
+                </a:solidFill>
+              </a:rPr>
+              <a:t>.</a:t>
             </a:r>
           </a:p>
           <a:p>
             <a:pPr marL="342900" indent="-342900">
+              <a:buFontTx/>
               <a:buAutoNum type="arabicPeriod"/>
             </a:pPr>
+            <a:r>
+              <a:rPr lang="en-US" dirty="0" smtClean="0">
+                <a:solidFill>
+                  <a:srgbClr val="FF0000"/>
+                </a:solidFill>
+              </a:rPr>
+              <a:t>NO </a:t>
+            </a:r>
             <a:r>
               <a:rPr lang="en-US" dirty="0">
                 <a:solidFill>
                   <a:srgbClr val="FF0000"/>
                 </a:solidFill>
               </a:rPr>
-              <a:t>NO ! </a:t>
+              <a:t>! </a:t>
+            </a:r>
+            <a:r>
+              <a:rPr lang="en-US" dirty="0"/>
+              <a:t>Cache things out of the box</a:t>
             </a:r>
             <a:r>
               <a:rPr lang="en-US" dirty="0" smtClean="0"/>
-              <a:t>Robust scaffolding.</a:t>
+              <a:t>.</a:t>
             </a:r>
           </a:p>
           <a:p>
@@ -13363,39 +14487,90 @@
               <a:buFontTx/>
               <a:buAutoNum type="arabicPeriod"/>
             </a:pPr>
+            <a:r>
+              <a:rPr lang="en-US" dirty="0" err="1" smtClean="0">
+                <a:solidFill>
+                  <a:srgbClr val="FF0000"/>
+                </a:solidFill>
+              </a:rPr>
+              <a:t>DevMvcComponent</a:t>
+            </a:r>
+            <a:r>
+              <a:rPr lang="en-US" dirty="0" smtClean="0">
+                <a:solidFill>
+                  <a:srgbClr val="FF0000"/>
+                </a:solidFill>
+              </a:rPr>
+              <a:t> is not implemented.</a:t>
+            </a:r>
+          </a:p>
+          <a:p>
+            <a:pPr marL="342900" indent="-342900">
+              <a:buFontTx/>
+              <a:buAutoNum type="arabicPeriod"/>
+            </a:pPr>
+            <a:r>
+              <a:rPr lang="en-US" dirty="0" smtClean="0">
+                <a:solidFill>
+                  <a:srgbClr val="FF0000"/>
+                </a:solidFill>
+              </a:rPr>
+              <a:t>NO </a:t>
+            </a:r>
             <a:r>
               <a:rPr lang="en-US" dirty="0">
                 <a:solidFill>
                   <a:srgbClr val="FF0000"/>
                 </a:solidFill>
               </a:rPr>
-              <a:t>NO ! </a:t>
-            </a:r>
-            <a:r>
-              <a:rPr lang="en-US" dirty="0" err="1"/>
-              <a:t>Javascript</a:t>
+              <a:t>! </a:t>
+            </a:r>
+            <a:r>
+              <a:rPr lang="en-US" dirty="0" smtClean="0"/>
+              <a:t>IP </a:t>
             </a:r>
             <a:r>
               <a:rPr lang="en-US" dirty="0"/>
-              <a:t> framework</a:t>
-            </a:r>
+              <a:t>to country detection</a:t>
+            </a:r>
+            <a:r>
+              <a:rPr lang="en-US" dirty="0" smtClean="0"/>
+              <a:t>.</a:t>
+            </a:r>
+            <a:endParaRPr lang="en-US" dirty="0" smtClean="0">
+              <a:solidFill>
+                <a:srgbClr val="FF0000"/>
+              </a:solidFill>
+            </a:endParaRPr>
           </a:p>
           <a:p>
             <a:pPr marL="342900" indent="-342900">
               <a:buFontTx/>
               <a:buAutoNum type="arabicPeriod"/>
             </a:pPr>
+            <a:r>
+              <a:rPr lang="en-US" dirty="0" smtClean="0">
+                <a:solidFill>
+                  <a:srgbClr val="FF0000"/>
+                </a:solidFill>
+              </a:rPr>
+              <a:t>NO </a:t>
+            </a:r>
             <a:r>
               <a:rPr lang="en-US" dirty="0">
                 <a:solidFill>
                   <a:srgbClr val="FF0000"/>
                 </a:solidFill>
               </a:rPr>
-              <a:t>NO ! </a:t>
+              <a:t>! </a:t>
+            </a:r>
+            <a:r>
+              <a:rPr lang="en-US" dirty="0" err="1"/>
+              <a:t>Javascript</a:t>
             </a:r>
             <a:r>
               <a:rPr lang="en-US" dirty="0"/>
-              <a:t>Cache things out of the box.</a:t>
+              <a:t> framework</a:t>
             </a:r>
           </a:p>
           <a:p>
@@ -13404,7 +14579,7 @@
             </a:pPr>
             <a:r>
               <a:rPr lang="en-US" dirty="0" smtClean="0"/>
-              <a:t>Make your own.</a:t>
+              <a:t>We have to make our own.</a:t>
             </a:r>
           </a:p>
           <a:p>
@@ -13950,9 +15125,9 @@
                                           </p:stCondLst>
                                         </p:cTn>
                                         <p:tgtEl>
-                                          <p:spTgt spid="3">
+                                          <p:spTgt spid="6">
                                             <p:txEl>
-                                              <p:pRg st="0" end="0"/>
+                                              <p:pRg st="1" end="1"/>
                                             </p:txEl>
                                           </p:spTgt>
                                         </p:tgtEl>
@@ -13968,9 +15143,9 @@
                                       <p:cBhvr>
                                         <p:cTn id="48" dur="500"/>
                                         <p:tgtEl>
-                                          <p:spTgt spid="3">
+                                          <p:spTgt spid="6">
                                             <p:txEl>
-                                              <p:pRg st="0" end="0"/>
+                                              <p:pRg st="1" end="1"/>
                                             </p:txEl>
                                           </p:spTgt>
                                         </p:tgtEl>
@@ -14013,7 +15188,7 @@
                                         <p:tgtEl>
                                           <p:spTgt spid="6">
                                             <p:txEl>
-                                              <p:pRg st="1" end="1"/>
+                                              <p:pRg st="2" end="2"/>
                                             </p:txEl>
                                           </p:spTgt>
                                         </p:tgtEl>
@@ -14031,7 +15206,7 @@
                                         <p:tgtEl>
                                           <p:spTgt spid="6">
                                             <p:txEl>
-                                              <p:pRg st="1" end="1"/>
+                                              <p:pRg st="2" end="2"/>
                                             </p:txEl>
                                           </p:spTgt>
                                         </p:tgtEl>
@@ -14133,7 +15308,7 @@
                                           </p:stCondLst>
                                         </p:cTn>
                                         <p:tgtEl>
-                                          <p:spTgt spid="6">
+                                          <p:spTgt spid="19">
                                             <p:txEl>
                                               <p:pRg st="2" end="2"/>
                                             </p:txEl>
@@ -14151,7 +15326,7 @@
                                       <p:cBhvr>
                                         <p:cTn id="63" dur="500"/>
                                         <p:tgtEl>
-                                          <p:spTgt spid="6">
+                                          <p:spTgt spid="19">
                                             <p:txEl>
                                               <p:pRg st="2" end="2"/>
                                             </p:txEl>
@@ -14194,9 +15369,9 @@
                                           </p:stCondLst>
                                         </p:cTn>
                                         <p:tgtEl>
-                                          <p:spTgt spid="19">
+                                          <p:spTgt spid="3">
                                             <p:txEl>
-                                              <p:pRg st="2" end="2"/>
+                                              <p:pRg st="0" end="0"/>
                                             </p:txEl>
                                           </p:spTgt>
                                         </p:tgtEl>
@@ -14212,9 +15387,9 @@
                                       <p:cBhvr>
                                         <p:cTn id="68" dur="500"/>
                                         <p:tgtEl>
-                                          <p:spTgt spid="19">
+                                          <p:spTgt spid="3">
                                             <p:txEl>
-                                              <p:pRg st="2" end="2"/>
+                                              <p:pRg st="0" end="0"/>
                                             </p:txEl>
                                           </p:spTgt>
                                         </p:tgtEl>
@@ -15069,6 +16244,128 @@
                                           <p:spTgt spid="19">
                                             <p:txEl>
                                               <p:pRg st="9" end="9"/>
+                                            </p:txEl>
+                                          </p:spTgt>
+                                        </p:tgtEl>
+                                      </p:cBhvr>
+                                    </p:animEffect>
+                                  </p:childTnLst>
+                                </p:cTn>
+                              </p:par>
+                            </p:childTnLst>
+                          </p:cTn>
+                        </p:par>
+                      </p:childTnLst>
+                    </p:cTn>
+                  </p:par>
+                  <p:par>
+                    <p:cTn id="139" fill="hold">
+                      <p:stCondLst>
+                        <p:cond delay="indefinite"/>
+                      </p:stCondLst>
+                      <p:childTnLst>
+                        <p:par>
+                          <p:cTn id="140" fill="hold">
+                            <p:stCondLst>
+                              <p:cond delay="0"/>
+                            </p:stCondLst>
+                            <p:childTnLst>
+                              <p:par>
+                                <p:cTn id="141" presetID="10" presetClass="entr" presetSubtype="0" fill="hold" grpId="0" nodeType="clickEffect">
+                                  <p:stCondLst>
+                                    <p:cond delay="0"/>
+                                  </p:stCondLst>
+                                  <p:childTnLst>
+                                    <p:set>
+                                      <p:cBhvr>
+                                        <p:cTn id="142" dur="1" fill="hold">
+                                          <p:stCondLst>
+                                            <p:cond delay="0"/>
+                                          </p:stCondLst>
+                                        </p:cTn>
+                                        <p:tgtEl>
+                                          <p:spTgt spid="6">
+                                            <p:txEl>
+                                              <p:pRg st="10" end="10"/>
+                                            </p:txEl>
+                                          </p:spTgt>
+                                        </p:tgtEl>
+                                        <p:attrNameLst>
+                                          <p:attrName>style.visibility</p:attrName>
+                                        </p:attrNameLst>
+                                      </p:cBhvr>
+                                      <p:to>
+                                        <p:strVal val="visible"/>
+                                      </p:to>
+                                    </p:set>
+                                    <p:animEffect transition="in" filter="fade">
+                                      <p:cBhvr>
+                                        <p:cTn id="143" dur="500"/>
+                                        <p:tgtEl>
+                                          <p:spTgt spid="6">
+                                            <p:txEl>
+                                              <p:pRg st="10" end="10"/>
+                                            </p:txEl>
+                                          </p:spTgt>
+                                        </p:tgtEl>
+                                      </p:cBhvr>
+                                    </p:animEffect>
+                                  </p:childTnLst>
+                                </p:cTn>
+                              </p:par>
+                            </p:childTnLst>
+                          </p:cTn>
+                        </p:par>
+                      </p:childTnLst>
+                    </p:cTn>
+                  </p:par>
+                  <p:par>
+                    <p:cTn id="144" fill="hold">
+                      <p:stCondLst>
+                        <p:cond delay="indefinite"/>
+                      </p:stCondLst>
+                      <p:childTnLst>
+                        <p:par>
+                          <p:cTn id="145" fill="hold">
+                            <p:stCondLst>
+                              <p:cond delay="0"/>
+                            </p:stCondLst>
+                            <p:childTnLst>
+                              <p:par>
+                                <p:cTn id="146" presetID="10" presetClass="entr" presetSubtype="0" fill="hold" grpId="0" nodeType="clickEffect">
+                                  <p:stCondLst>
+                                    <p:cond delay="0"/>
+                                  </p:stCondLst>
+                                  <p:childTnLst>
+                                    <p:set>
+                                      <p:cBhvr>
+                                        <p:cTn id="147" dur="1" fill="hold">
+                                          <p:stCondLst>
+                                            <p:cond delay="0"/>
+                                          </p:stCondLst>
+                                        </p:cTn>
+                                        <p:tgtEl>
+                                          <p:spTgt spid="19">
+                                            <p:txEl>
+                                              <p:pRg st="10" end="10"/>
+                                            </p:txEl>
+                                          </p:spTgt>
+                                        </p:tgtEl>
+                                        <p:attrNameLst>
+                                          <p:attrName>style.visibility</p:attrName>
+                                        </p:attrNameLst>
+                                      </p:cBhvr>
+                                      <p:to>
+                                        <p:strVal val="visible"/>
+                                      </p:to>
+                                    </p:set>
+                                    <p:animEffect transition="in" filter="fade">
+                                      <p:cBhvr>
+                                        <p:cTn id="148" dur="500"/>
+                                        <p:tgtEl>
+                                          <p:spTgt spid="19">
+                                            <p:txEl>
+                                              <p:pRg st="10" end="10"/>
                                             </p:txEl>
                                           </p:spTgt>
                                         </p:tgtEl>

</xml_diff>